<commit_message>
Agregando primer version del cartel para presentacion de aplicaicon de modelos de pronostico a demanda_electrico_v2
</commit_message>
<xml_diff>
--- a/CARTEL_PRONOSTICOS_Modelos_de_pronostico_aplicados_a_ademanda_De_gas_natural_v2.pptx
+++ b/CARTEL_PRONOSTICOS_Modelos_de_pronostico_aplicados_a_ademanda_De_gas_natural_v2.pptx
@@ -285,7 +285,7 @@
       </p15:sldGuideLst>
     </p:ext>
     <p:ext uri="http://customooxmlschemas.google.com/">
-      <go:slidesCustomData xmlns="" xmlns:mc="http://schemas.openxmlformats.org/markup-compatibility/2006" xmlns:mv="urn:schemas-microsoft-com:mac:vml" xmlns:c="http://schemas.openxmlformats.org/drawingml/2006/chart" xmlns:dgm="http://schemas.openxmlformats.org/drawingml/2006/diagram" xmlns:o="urn:schemas-microsoft-com:office:office" xmlns:v="urn:schemas-microsoft-com:vml" xmlns:pvml="urn:schemas-microsoft-com:office:powerpoint" xmlns:com="http://schemas.openxmlformats.org/drawingml/2006/compatibility" xmlns:p14="http://schemas.microsoft.com/office/powerpoint/2010/main" xmlns:p15="http://schemas.microsoft.com/office/powerpoint/2012/main" xmlns:ahyp="http://schemas.microsoft.com/office/drawing/2018/hyperlinkcolor" xmlns:go="http://customooxmlschemas.google.com/" r:id="rId16" roundtripDataSignature="AMtx7miQDVQXGM3vnSjUw7xkqrap4wCZRg=="/>
+      <go:slidesCustomData xmlns:go="http://customooxmlschemas.google.com/" xmlns:ahyp="http://schemas.microsoft.com/office/drawing/2018/hyperlinkcolor" xmlns:p15="http://schemas.microsoft.com/office/powerpoint/2012/main" xmlns:p14="http://schemas.microsoft.com/office/powerpoint/2010/main" xmlns:com="http://schemas.openxmlformats.org/drawingml/2006/compatibility" xmlns:pvml="urn:schemas-microsoft-com:office:powerpoint" xmlns:v="urn:schemas-microsoft-com:vml" xmlns:o="urn:schemas-microsoft-com:office:office" xmlns:dgm="http://schemas.openxmlformats.org/drawingml/2006/diagram" xmlns:c="http://schemas.openxmlformats.org/drawingml/2006/chart" xmlns:mv="urn:schemas-microsoft-com:mac:vml" xmlns:mc="http://schemas.openxmlformats.org/markup-compatibility/2006" xmlns="" r:id="rId16" roundtripDataSignature="AMtx7miQDVQXGM3vnSjUw7xkqrap4wCZRg=="/>
     </p:ext>
   </p:extLst>
 </p:presentation>
@@ -294,8 +294,7 @@
 <file path=ppt/revisionInfo.xml><?xml version="1.0" encoding="utf-8"?>
 <p1510:revInfo xmlns:a="http://schemas.openxmlformats.org/drawingml/2006/main" xmlns:r="http://schemas.openxmlformats.org/officeDocument/2006/relationships" xmlns:p1510="http://schemas.microsoft.com/office/powerpoint/2015/10/main">
   <p1510:revLst>
-    <p1510:client id="{21DC11EA-D7FF-43B6-9FDD-5A9C4155BDFE}" v="15" dt="2023-05-23T22:06:00.857"/>
-    <p1510:client id="{C7CB6346-8C86-415E-914C-0E6252079731}" v="145" dt="2023-05-23T00:35:21.247"/>
+    <p1510:client id="{21DC11EA-D7FF-43B6-9FDD-5A9C4155BDFE}" v="20" dt="2023-05-24T01:40:37.094"/>
   </p1510:revLst>
 </p1510:revInfo>
 </file>
@@ -304,23 +303,71 @@
 <pc:chgInfo xmlns:a="http://schemas.openxmlformats.org/drawingml/2006/main" xmlns:r="http://schemas.openxmlformats.org/officeDocument/2006/relationships" xmlns:ac="http://schemas.microsoft.com/office/drawing/2013/main/command" xmlns:pc="http://schemas.microsoft.com/office/powerpoint/2013/main/command">
   <pc:docChgLst>
     <pc:chgData name="Sergio Ibarra" userId="f9e6e0322c927b48" providerId="LiveId" clId="{21DC11EA-D7FF-43B6-9FDD-5A9C4155BDFE}"/>
-    <pc:docChg chg="custSel modSld">
-      <pc:chgData name="Sergio Ibarra" userId="f9e6e0322c927b48" providerId="LiveId" clId="{21DC11EA-D7FF-43B6-9FDD-5A9C4155BDFE}" dt="2023-05-23T22:19:56.722" v="935" actId="20577"/>
+    <pc:docChg chg="undo custSel modSld">
+      <pc:chgData name="Sergio Ibarra" userId="f9e6e0322c927b48" providerId="LiveId" clId="{21DC11EA-D7FF-43B6-9FDD-5A9C4155BDFE}" dt="2023-05-24T01:41:43.429" v="2051" actId="1036"/>
       <pc:docMkLst>
         <pc:docMk/>
       </pc:docMkLst>
       <pc:sldChg chg="addSp delSp modSp mod">
-        <pc:chgData name="Sergio Ibarra" userId="f9e6e0322c927b48" providerId="LiveId" clId="{21DC11EA-D7FF-43B6-9FDD-5A9C4155BDFE}" dt="2023-05-23T22:19:56.722" v="935" actId="20577"/>
+        <pc:chgData name="Sergio Ibarra" userId="f9e6e0322c927b48" providerId="LiveId" clId="{21DC11EA-D7FF-43B6-9FDD-5A9C4155BDFE}" dt="2023-05-24T01:41:43.429" v="2051" actId="1036"/>
         <pc:sldMkLst>
           <pc:docMk/>
           <pc:sldMk cId="2665960598" sldId="261"/>
         </pc:sldMkLst>
         <pc:spChg chg="mod">
-          <ac:chgData name="Sergio Ibarra" userId="f9e6e0322c927b48" providerId="LiveId" clId="{21DC11EA-D7FF-43B6-9FDD-5A9C4155BDFE}" dt="2023-05-23T22:07:25.222" v="441" actId="20577"/>
+          <ac:chgData name="Sergio Ibarra" userId="f9e6e0322c927b48" providerId="LiveId" clId="{21DC11EA-D7FF-43B6-9FDD-5A9C4155BDFE}" dt="2023-05-24T01:39:23.105" v="1933" actId="313"/>
+          <ac:spMkLst>
+            <pc:docMk/>
+            <pc:sldMk cId="2665960598" sldId="261"/>
+            <ac:spMk id="2" creationId="{290B10F5-34AB-9F35-3B00-09E9158E64E0}"/>
+          </ac:spMkLst>
+        </pc:spChg>
+        <pc:spChg chg="mod">
+          <ac:chgData name="Sergio Ibarra" userId="f9e6e0322c927b48" providerId="LiveId" clId="{21DC11EA-D7FF-43B6-9FDD-5A9C4155BDFE}" dt="2023-05-24T01:33:12.537" v="1914" actId="1035"/>
+          <ac:spMkLst>
+            <pc:docMk/>
+            <pc:sldMk cId="2665960598" sldId="261"/>
+            <ac:spMk id="4" creationId="{A03C1D89-0E0E-5B2B-11E3-9F0758203DB2}"/>
+          </ac:spMkLst>
+        </pc:spChg>
+        <pc:spChg chg="mod">
+          <ac:chgData name="Sergio Ibarra" userId="f9e6e0322c927b48" providerId="LiveId" clId="{21DC11EA-D7FF-43B6-9FDD-5A9C4155BDFE}" dt="2023-05-24T01:33:00.003" v="1886" actId="20577"/>
+          <ac:spMkLst>
+            <pc:docMk/>
+            <pc:sldMk cId="2665960598" sldId="261"/>
+            <ac:spMk id="6" creationId="{19860553-E3AD-FBF8-3CFF-86641C821CF8}"/>
+          </ac:spMkLst>
+        </pc:spChg>
+        <pc:spChg chg="mod">
+          <ac:chgData name="Sergio Ibarra" userId="f9e6e0322c927b48" providerId="LiveId" clId="{21DC11EA-D7FF-43B6-9FDD-5A9C4155BDFE}" dt="2023-05-23T22:55:49.929" v="1009" actId="1038"/>
+          <ac:spMkLst>
+            <pc:docMk/>
+            <pc:sldMk cId="2665960598" sldId="261"/>
+            <ac:spMk id="8" creationId="{45C2BDA2-0084-3429-5821-EAE0BE86367F}"/>
+          </ac:spMkLst>
+        </pc:spChg>
+        <pc:spChg chg="mod">
+          <ac:chgData name="Sergio Ibarra" userId="f9e6e0322c927b48" providerId="LiveId" clId="{21DC11EA-D7FF-43B6-9FDD-5A9C4155BDFE}" dt="2023-05-23T22:57:41.004" v="1234" actId="1035"/>
           <ac:spMkLst>
             <pc:docMk/>
             <pc:sldMk cId="2665960598" sldId="261"/>
             <ac:spMk id="10" creationId="{E31D09DC-CA6D-F7B6-4422-53B4E9DC1709}"/>
+          </ac:spMkLst>
+        </pc:spChg>
+        <pc:spChg chg="mod">
+          <ac:chgData name="Sergio Ibarra" userId="f9e6e0322c927b48" providerId="LiveId" clId="{21DC11EA-D7FF-43B6-9FDD-5A9C4155BDFE}" dt="2023-05-24T01:33:22.734" v="1915" actId="790"/>
+          <ac:spMkLst>
+            <pc:docMk/>
+            <pc:sldMk cId="2665960598" sldId="261"/>
+            <ac:spMk id="11" creationId="{8C5FBCAC-6DAD-DC5E-D5CD-0AD0CC02BAA7}"/>
+          </ac:spMkLst>
+        </pc:spChg>
+        <pc:spChg chg="mod">
+          <ac:chgData name="Sergio Ibarra" userId="f9e6e0322c927b48" providerId="LiveId" clId="{21DC11EA-D7FF-43B6-9FDD-5A9C4155BDFE}" dt="2023-05-24T01:38:49.326" v="1926" actId="20577"/>
+          <ac:spMkLst>
+            <pc:docMk/>
+            <pc:sldMk cId="2665960598" sldId="261"/>
+            <ac:spMk id="14" creationId="{ED21C892-A308-1335-8AEB-1404693A35E7}"/>
           </ac:spMkLst>
         </pc:spChg>
         <pc:spChg chg="add del">
@@ -332,7 +379,7 @@
           </ac:spMkLst>
         </pc:spChg>
         <pc:spChg chg="mod">
-          <ac:chgData name="Sergio Ibarra" userId="f9e6e0322c927b48" providerId="LiveId" clId="{21DC11EA-D7FF-43B6-9FDD-5A9C4155BDFE}" dt="2023-05-23T22:07:19.450" v="436" actId="255"/>
+          <ac:chgData name="Sergio Ibarra" userId="f9e6e0322c927b48" providerId="LiveId" clId="{21DC11EA-D7FF-43B6-9FDD-5A9C4155BDFE}" dt="2023-05-23T23:47:48.672" v="1322" actId="20577"/>
           <ac:spMkLst>
             <pc:docMk/>
             <pc:sldMk cId="2665960598" sldId="261"/>
@@ -340,7 +387,7 @@
           </ac:spMkLst>
         </pc:spChg>
         <pc:spChg chg="mod">
-          <ac:chgData name="Sergio Ibarra" userId="f9e6e0322c927b48" providerId="LiveId" clId="{21DC11EA-D7FF-43B6-9FDD-5A9C4155BDFE}" dt="2023-05-23T22:16:14.137" v="749" actId="20577"/>
+          <ac:chgData name="Sergio Ibarra" userId="f9e6e0322c927b48" providerId="LiveId" clId="{21DC11EA-D7FF-43B6-9FDD-5A9C4155BDFE}" dt="2023-05-24T01:40:09.508" v="1951" actId="115"/>
           <ac:spMkLst>
             <pc:docMk/>
             <pc:sldMk cId="2665960598" sldId="261"/>
@@ -348,7 +395,7 @@
           </ac:spMkLst>
         </pc:spChg>
         <pc:spChg chg="mod">
-          <ac:chgData name="Sergio Ibarra" userId="f9e6e0322c927b48" providerId="LiveId" clId="{21DC11EA-D7FF-43B6-9FDD-5A9C4155BDFE}" dt="2023-05-23T22:07:19.450" v="436" actId="255"/>
+          <ac:chgData name="Sergio Ibarra" userId="f9e6e0322c927b48" providerId="LiveId" clId="{21DC11EA-D7FF-43B6-9FDD-5A9C4155BDFE}" dt="2023-05-24T01:39:45.938" v="1949" actId="1035"/>
           <ac:spMkLst>
             <pc:docMk/>
             <pc:sldMk cId="2665960598" sldId="261"/>
@@ -356,7 +403,15 @@
           </ac:spMkLst>
         </pc:spChg>
         <pc:spChg chg="mod">
-          <ac:chgData name="Sergio Ibarra" userId="f9e6e0322c927b48" providerId="LiveId" clId="{21DC11EA-D7FF-43B6-9FDD-5A9C4155BDFE}" dt="2023-05-23T22:07:19.450" v="436" actId="255"/>
+          <ac:chgData name="Sergio Ibarra" userId="f9e6e0322c927b48" providerId="LiveId" clId="{21DC11EA-D7FF-43B6-9FDD-5A9C4155BDFE}" dt="2023-05-24T01:40:46.177" v="1958" actId="108"/>
+          <ac:spMkLst>
+            <pc:docMk/>
+            <pc:sldMk cId="2665960598" sldId="261"/>
+            <ac:spMk id="22" creationId="{8E26EFB9-D145-46C7-C9A8-C7D7B9EABF1D}"/>
+          </ac:spMkLst>
+        </pc:spChg>
+        <pc:spChg chg="mod">
+          <ac:chgData name="Sergio Ibarra" userId="f9e6e0322c927b48" providerId="LiveId" clId="{21DC11EA-D7FF-43B6-9FDD-5A9C4155BDFE}" dt="2023-05-24T01:39:32.614" v="1940" actId="20577"/>
           <ac:spMkLst>
             <pc:docMk/>
             <pc:sldMk cId="2665960598" sldId="261"/>
@@ -379,16 +434,32 @@
             <ac:spMk id="32" creationId="{89C3F7B9-9BAA-4A7B-EF44-2E0C9438B6E2}"/>
           </ac:spMkLst>
         </pc:spChg>
-        <pc:graphicFrameChg chg="modGraphic">
-          <ac:chgData name="Sergio Ibarra" userId="f9e6e0322c927b48" providerId="LiveId" clId="{21DC11EA-D7FF-43B6-9FDD-5A9C4155BDFE}" dt="2023-05-23T22:03:24.487" v="208" actId="20577"/>
+        <pc:graphicFrameChg chg="mod modGraphic">
+          <ac:chgData name="Sergio Ibarra" userId="f9e6e0322c927b48" providerId="LiveId" clId="{21DC11EA-D7FF-43B6-9FDD-5A9C4155BDFE}" dt="2023-05-24T01:39:42.256" v="1942" actId="1036"/>
           <ac:graphicFrameMkLst>
             <pc:docMk/>
             <pc:sldMk cId="2665960598" sldId="261"/>
             <ac:graphicFrameMk id="3" creationId="{5BC660B6-2C8F-8E9E-81B6-631505EC40D0}"/>
           </ac:graphicFrameMkLst>
         </pc:graphicFrameChg>
+        <pc:graphicFrameChg chg="add mod modGraphic">
+          <ac:chgData name="Sergio Ibarra" userId="f9e6e0322c927b48" providerId="LiveId" clId="{21DC11EA-D7FF-43B6-9FDD-5A9C4155BDFE}" dt="2023-05-24T01:41:34.759" v="2032" actId="20577"/>
+          <ac:graphicFrameMkLst>
+            <pc:docMk/>
+            <pc:sldMk cId="2665960598" sldId="261"/>
+            <ac:graphicFrameMk id="15" creationId="{F9CDF176-9F59-52E3-6189-2A63A4693605}"/>
+          </ac:graphicFrameMkLst>
+        </pc:graphicFrameChg>
+        <pc:graphicFrameChg chg="mod">
+          <ac:chgData name="Sergio Ibarra" userId="f9e6e0322c927b48" providerId="LiveId" clId="{21DC11EA-D7FF-43B6-9FDD-5A9C4155BDFE}" dt="2023-05-23T23:48:05.218" v="1328" actId="1036"/>
+          <ac:graphicFrameMkLst>
+            <pc:docMk/>
+            <pc:sldMk cId="2665960598" sldId="261"/>
+            <ac:graphicFrameMk id="21" creationId="{421322DC-8416-44B8-2045-6A0EB727BEF3}"/>
+          </ac:graphicFrameMkLst>
+        </pc:graphicFrameChg>
         <pc:graphicFrameChg chg="mod modGraphic">
-          <ac:chgData name="Sergio Ibarra" userId="f9e6e0322c927b48" providerId="LiveId" clId="{21DC11EA-D7FF-43B6-9FDD-5A9C4155BDFE}" dt="2023-05-23T22:19:56.722" v="935" actId="20577"/>
+          <ac:chgData name="Sergio Ibarra" userId="f9e6e0322c927b48" providerId="LiveId" clId="{21DC11EA-D7FF-43B6-9FDD-5A9C4155BDFE}" dt="2023-05-23T23:48:09.214" v="1333" actId="1036"/>
           <ac:graphicFrameMkLst>
             <pc:docMk/>
             <pc:sldMk cId="2665960598" sldId="261"/>
@@ -428,7 +499,7 @@
           </ac:picMkLst>
         </pc:picChg>
         <pc:picChg chg="mod">
-          <ac:chgData name="Sergio Ibarra" userId="f9e6e0322c927b48" providerId="LiveId" clId="{21DC11EA-D7FF-43B6-9FDD-5A9C4155BDFE}" dt="2023-05-23T22:05:30.755" v="322" actId="1035"/>
+          <ac:chgData name="Sergio Ibarra" userId="f9e6e0322c927b48" providerId="LiveId" clId="{21DC11EA-D7FF-43B6-9FDD-5A9C4155BDFE}" dt="2023-05-24T01:41:43.429" v="2051" actId="1036"/>
           <ac:picMkLst>
             <pc:docMk/>
             <pc:sldMk cId="2665960598" sldId="261"/>
@@ -444,7 +515,7 @@
           </ac:picMkLst>
         </pc:picChg>
         <pc:picChg chg="add mod">
-          <ac:chgData name="Sergio Ibarra" userId="f9e6e0322c927b48" providerId="LiveId" clId="{21DC11EA-D7FF-43B6-9FDD-5A9C4155BDFE}" dt="2023-05-23T22:06:10.116" v="346" actId="1076"/>
+          <ac:chgData name="Sergio Ibarra" userId="f9e6e0322c927b48" providerId="LiveId" clId="{21DC11EA-D7FF-43B6-9FDD-5A9C4155BDFE}" dt="2023-05-24T01:41:43.429" v="2051" actId="1036"/>
           <ac:picMkLst>
             <pc:docMk/>
             <pc:sldMk cId="2665960598" sldId="261"/>
@@ -13806,7 +13877,7 @@
                 <a:latin typeface="+mn-lt"/>
                 <a:sym typeface="Encode Sans ExtraLight"/>
               </a:rPr>
-              <a:t>Históricamente la Secretaría de Energía (SENER) había hecho hasta 2018 un Informe Anual sobre gas natural en donde prospectaba consumos a 10-12 años con un error MAPE promedio de 20-25%. </a:t>
+              <a:t>Históricamente la Secretaría de Energía (SENER) había hecho hasta 2018 un “Informe Anual sobre gas natural” en donde prospectaba consumos a 10-12 años con un error MAPE promedio de 20-25%. </a:t>
             </a:r>
           </a:p>
           <a:p>
@@ -13827,7 +13898,7 @@
                 <a:latin typeface="+mn-lt"/>
                 <a:sym typeface="Encode Sans ExtraLight"/>
               </a:rPr>
-              <a:t>A partir de 2019 no se tiene un pronóstico oficial de la demanda de dicho hidrocarburo. </a:t>
+              <a:t>A partir de 2019 no se tiene un pronóstico oficial de la demanda de dicho hidrocarburo en el país. </a:t>
             </a:r>
           </a:p>
         </p:txBody>
@@ -13907,7 +13978,7 @@
         </p:nvSpPr>
         <p:spPr>
           <a:xfrm>
-            <a:off x="318485" y="7316787"/>
+            <a:off x="316240" y="7339393"/>
             <a:ext cx="4567045" cy="6927875"/>
           </a:xfrm>
           <a:prstGeom prst="roundRect">
@@ -14382,8 +14453,8 @@
         </p:nvSpPr>
         <p:spPr>
           <a:xfrm>
-            <a:off x="378293" y="4337753"/>
-            <a:ext cx="8975873" cy="783679"/>
+            <a:off x="378293" y="4261553"/>
+            <a:ext cx="8975873" cy="637485"/>
           </a:xfrm>
           <a:prstGeom prst="rect">
             <a:avLst/>
@@ -14423,25 +14494,7 @@
                 </a:solidFill>
                 <a:latin typeface="+mn-lt"/>
               </a:rPr>
-              <a:t>La teoría de pronósticos busca determinar el valor más probable de una variable dependiente (Y) en función de variables independientes (x1,x2, x3, </a:t>
-            </a:r>
-            <a:r>
-              <a:rPr lang="es-MX" sz="1000" dirty="0" err="1">
-                <a:solidFill>
-                  <a:schemeClr val="tx1"/>
-                </a:solidFill>
-                <a:latin typeface="+mn-lt"/>
-              </a:rPr>
-              <a:t>etc</a:t>
-            </a:r>
-            <a:r>
-              <a:rPr lang="es-MX" sz="1000" dirty="0">
-                <a:solidFill>
-                  <a:schemeClr val="tx1"/>
-                </a:solidFill>
-                <a:latin typeface="+mn-lt"/>
-              </a:rPr>
-              <a:t>) . En este caso se abordarán dos casos principalmente , </a:t>
+              <a:t>La teoría de pronósticos busca determinar el valor más probable de una variable dependiente (Y) en función de variables independientes (x1,x2, x3, etc.) . En este caso se abordarán dos casos principalmente , </a:t>
             </a:r>
           </a:p>
           <a:p>
@@ -14469,7 +14522,7 @@
                 </a:solidFill>
                 <a:latin typeface="+mn-lt"/>
               </a:rPr>
-              <a:t>A) El modelo lineal generalizado (GLM, por sus siglas en inglés) para pronóstico en el que las variables x1, x2,..xn deben ser variables independientes entre si, pero que mantengan una relación (lineal con respecto al parámetro a estimar y por tanto con respecto a la variable independiente (Y)) y que tiene la siguiente forma: </a:t>
+              <a:t>A) El modelo lineal generalizado (GLM, por sus siglas en inglés); en el que las variables x1, x2,..xn deben ser variables independientes entre si, pero que mantengan una relación (lineal con respecto al parámetro a estimar y por tanto con respecto a la variable independiente Y) y que tiene la siguiente forma: </a:t>
             </a:r>
           </a:p>
         </p:txBody>
@@ -14489,7 +14542,7 @@
         <p:spPr>
           <a:xfrm>
             <a:off x="416898" y="8861383"/>
-            <a:ext cx="4481669" cy="666724"/>
+            <a:ext cx="4481669" cy="820228"/>
           </a:xfrm>
           <a:prstGeom prst="rect">
             <a:avLst/>
@@ -14532,7 +14585,7 @@
                 <a:cs typeface="Encode Sans ExtraLight"/>
                 <a:sym typeface="Encode Sans ExtraLight"/>
               </a:rPr>
-              <a:t>Se aplico el GLM para la predicción de 12 meses de demanda de gas natural en el sector eléctrico mexicano como función de la Población en México, así como del PIB.  </a:t>
+              <a:t>Se aplico el GLM para la predicción de 12 meses de demanda de gas natural en el sector eléctrico mexicano como función de la Población en México, así como del PIB.  (Utilizando datos de 201 meses como ‘datos de entrenamiento’)</a:t>
             </a:r>
           </a:p>
           <a:p>
@@ -14580,7 +14633,7 @@
         <p:spPr>
           <a:xfrm>
             <a:off x="5073148" y="7807559"/>
-            <a:ext cx="4281017" cy="2947348"/>
+            <a:ext cx="4281017" cy="3751415"/>
           </a:xfrm>
           <a:prstGeom prst="rect">
             <a:avLst/>
@@ -14621,7 +14674,27 @@
                 <a:latin typeface="+mn-lt"/>
                 <a:sym typeface="Encode Sans ExtraLight"/>
               </a:rPr>
-              <a:t>Los modelos lineales Generalizados (GLM) ofrecen una buena alternativa de pronóstico de una variable como la demanda de gas en función  de otras tales como el precio de importación del hidrocarburo, el PIB, </a:t>
+              <a:t>Los modelos lineales Generalizados (</a:t>
+            </a:r>
+            <a:r>
+              <a:rPr lang="es-MX" sz="1100" u="sng" dirty="0">
+                <a:solidFill>
+                  <a:schemeClr val="tx1"/>
+                </a:solidFill>
+                <a:latin typeface="+mn-lt"/>
+                <a:sym typeface="Encode Sans ExtraLight"/>
+              </a:rPr>
+              <a:t>GLM</a:t>
+            </a:r>
+            <a:r>
+              <a:rPr lang="es-MX" sz="1100" dirty="0">
+                <a:solidFill>
+                  <a:schemeClr val="tx1"/>
+                </a:solidFill>
+                <a:latin typeface="+mn-lt"/>
+                <a:sym typeface="Encode Sans ExtraLight"/>
+              </a:rPr>
+              <a:t>) ofrecen una buena alternativa de pronóstico de una variable como la demanda de gas en función  de otras tales como el precio de importación del hidrocarburo, el PIB, </a:t>
             </a:r>
             <a:r>
               <a:rPr lang="es-MX" sz="1100" dirty="0" err="1">
@@ -14641,7 +14714,17 @@
                 <a:latin typeface="+mn-lt"/>
                 <a:sym typeface="Encode Sans ExtraLight"/>
               </a:rPr>
-              <a:t>, sin embargo, el pronóstico final resulta no ser del todo preciso y está sujeto a la propia aleatoriedad de las variables predictoras que son en si problemas de pronóstico.</a:t>
+              <a:t>, sin embargo, el pronóstico final resulta no ser del todo preciso y </a:t>
+            </a:r>
+            <a:r>
+              <a:rPr lang="es-MX" sz="1100" u="sng" dirty="0">
+                <a:solidFill>
+                  <a:schemeClr val="tx1"/>
+                </a:solidFill>
+                <a:latin typeface="+mn-lt"/>
+                <a:sym typeface="Encode Sans ExtraLight"/>
+              </a:rPr>
+              <a:t>está sujeto a la propia aleatoriedad de las variables predictoras que son en si problemas de pronóstico.</a:t>
             </a:r>
           </a:p>
           <a:p>
@@ -14667,62 +14750,6 @@
                 <a:schemeClr val="tx1"/>
               </a:solidFill>
               <a:latin typeface="+mn-lt"/>
-              <a:sym typeface="Encode Sans ExtraLight"/>
-            </a:endParaRPr>
-          </a:p>
-          <a:p>
-            <a:pPr marL="0" marR="0" lvl="0" indent="0" algn="just" rtl="0">
-              <a:lnSpc>
-                <a:spcPct val="95000"/>
-              </a:lnSpc>
-              <a:spcBef>
-                <a:spcPts val="0"/>
-              </a:spcBef>
-              <a:spcAft>
-                <a:spcPts val="0"/>
-              </a:spcAft>
-              <a:buClr>
-                <a:schemeClr val="dk1"/>
-              </a:buClr>
-              <a:buSzPts val="1200"/>
-              <a:buFont typeface="Times New Roman"/>
-              <a:buNone/>
-            </a:pPr>
-            <a:endParaRPr lang="es-MX" sz="1100" dirty="0">
-              <a:solidFill>
-                <a:schemeClr val="tx1"/>
-              </a:solidFill>
-              <a:latin typeface="+mn-lt"/>
-              <a:ea typeface="Encode Sans Thin"/>
-              <a:cs typeface="Encode Sans Thin"/>
-              <a:sym typeface="Encode Sans ExtraLight"/>
-            </a:endParaRPr>
-          </a:p>
-          <a:p>
-            <a:pPr marL="0" marR="0" lvl="0" indent="0" algn="just" rtl="0">
-              <a:lnSpc>
-                <a:spcPct val="95000"/>
-              </a:lnSpc>
-              <a:spcBef>
-                <a:spcPts val="0"/>
-              </a:spcBef>
-              <a:spcAft>
-                <a:spcPts val="0"/>
-              </a:spcAft>
-              <a:buClr>
-                <a:schemeClr val="dk1"/>
-              </a:buClr>
-              <a:buSzPts val="1200"/>
-              <a:buFont typeface="Times New Roman"/>
-              <a:buNone/>
-            </a:pPr>
-            <a:endParaRPr lang="es-MX" sz="1100" dirty="0">
-              <a:solidFill>
-                <a:schemeClr val="tx1"/>
-              </a:solidFill>
-              <a:latin typeface="+mn-lt"/>
-              <a:ea typeface="Encode Sans Thin"/>
-              <a:cs typeface="Encode Sans Thin"/>
               <a:sym typeface="Encode Sans ExtraLight"/>
             </a:endParaRPr>
           </a:p>
@@ -14860,14 +14887,301 @@
               </a:rPr>
               <a:t>’ </a:t>
             </a:r>
-            <a:endParaRPr sz="1200" dirty="0">
+          </a:p>
+          <a:p>
+            <a:pPr marL="0" marR="0" lvl="0" indent="0" algn="just" rtl="0">
+              <a:lnSpc>
+                <a:spcPct val="95000"/>
+              </a:lnSpc>
+              <a:spcBef>
+                <a:spcPts val="0"/>
+              </a:spcBef>
+              <a:spcAft>
+                <a:spcPts val="0"/>
+              </a:spcAft>
+              <a:buClr>
+                <a:schemeClr val="dk1"/>
+              </a:buClr>
+              <a:buSzPts val="1200"/>
+              <a:buFont typeface="Times New Roman"/>
+              <a:buNone/>
+            </a:pPr>
+            <a:r>
+              <a:rPr lang="es-MX" sz="1100" dirty="0">
+                <a:solidFill>
+                  <a:schemeClr val="tx1"/>
+                </a:solidFill>
+                <a:latin typeface="+mn-lt"/>
+                <a:ea typeface="Encode Sans Thin"/>
+                <a:cs typeface="Encode Sans Thin"/>
+                <a:sym typeface="Encode Sans ExtraLight"/>
+              </a:rPr>
+              <a:t>La manera más recomendable de tratar datos con </a:t>
+            </a:r>
+            <a:r>
+              <a:rPr lang="es-MX" sz="1100" i="1" dirty="0" err="1">
+                <a:solidFill>
+                  <a:schemeClr val="tx1"/>
+                </a:solidFill>
+                <a:latin typeface="+mn-lt"/>
+                <a:ea typeface="Encode Sans Thin"/>
+                <a:cs typeface="Encode Sans Thin"/>
+                <a:sym typeface="Encode Sans ExtraLight"/>
+              </a:rPr>
+              <a:t>outliers</a:t>
+            </a:r>
+            <a:r>
+              <a:rPr lang="es-MX" sz="1100" dirty="0">
+                <a:solidFill>
+                  <a:schemeClr val="tx1"/>
+                </a:solidFill>
+                <a:latin typeface="+mn-lt"/>
+                <a:ea typeface="Encode Sans Thin"/>
+                <a:cs typeface="Encode Sans Thin"/>
+                <a:sym typeface="Encode Sans ExtraLight"/>
+              </a:rPr>
+              <a:t> tan marcados como los provocados por el </a:t>
+            </a:r>
+            <a:r>
+              <a:rPr lang="es-MX" sz="1100" dirty="0" err="1">
+                <a:solidFill>
+                  <a:schemeClr val="tx1"/>
+                </a:solidFill>
+                <a:latin typeface="+mn-lt"/>
+                <a:ea typeface="Encode Sans Thin"/>
+                <a:cs typeface="Encode Sans Thin"/>
+                <a:sym typeface="Encode Sans ExtraLight"/>
+              </a:rPr>
+              <a:t>covid</a:t>
+            </a:r>
+            <a:r>
+              <a:rPr lang="es-MX" sz="1100" dirty="0">
+                <a:solidFill>
+                  <a:schemeClr val="tx1"/>
+                </a:solidFill>
+                <a:latin typeface="+mn-lt"/>
+                <a:ea typeface="Encode Sans Thin"/>
+                <a:cs typeface="Encode Sans Thin"/>
+                <a:sym typeface="Encode Sans ExtraLight"/>
+              </a:rPr>
+              <a:t> 19 son:</a:t>
+            </a:r>
+          </a:p>
+          <a:p>
+            <a:pPr marL="228600" marR="0" lvl="0" indent="-228600" algn="just" rtl="0">
+              <a:lnSpc>
+                <a:spcPct val="95000"/>
+              </a:lnSpc>
+              <a:spcBef>
+                <a:spcPts val="0"/>
+              </a:spcBef>
+              <a:spcAft>
+                <a:spcPts val="0"/>
+              </a:spcAft>
+              <a:buClr>
+                <a:schemeClr val="dk1"/>
+              </a:buClr>
+              <a:buSzPct val="90000"/>
+              <a:buFont typeface="+mj-lt"/>
+              <a:buAutoNum type="alphaUcPeriod"/>
+            </a:pPr>
+            <a:r>
+              <a:rPr lang="es-MX" sz="1100" dirty="0">
+                <a:solidFill>
+                  <a:schemeClr val="tx1"/>
+                </a:solidFill>
+                <a:latin typeface="+mn-lt"/>
+                <a:ea typeface="Encode Sans Thin"/>
+                <a:cs typeface="Encode Sans Thin"/>
+                <a:sym typeface="Encode Sans ExtraLight"/>
+              </a:rPr>
+              <a:t>Intentar suavizar la serie original  (SMA, WMA, </a:t>
+            </a:r>
+            <a:r>
+              <a:rPr lang="es-MX" sz="1100" dirty="0" err="1">
+                <a:solidFill>
+                  <a:schemeClr val="tx1"/>
+                </a:solidFill>
+                <a:latin typeface="+mn-lt"/>
+                <a:ea typeface="Encode Sans Thin"/>
+                <a:cs typeface="Encode Sans Thin"/>
+                <a:sym typeface="Encode Sans ExtraLight"/>
+              </a:rPr>
+              <a:t>etc</a:t>
+            </a:r>
+            <a:r>
+              <a:rPr lang="es-MX" sz="1100" dirty="0">
+                <a:solidFill>
+                  <a:schemeClr val="tx1"/>
+                </a:solidFill>
+                <a:latin typeface="+mn-lt"/>
+                <a:ea typeface="Encode Sans Thin"/>
+                <a:cs typeface="Encode Sans Thin"/>
+                <a:sym typeface="Encode Sans ExtraLight"/>
+              </a:rPr>
+              <a:t>)</a:t>
+            </a:r>
+          </a:p>
+          <a:p>
+            <a:pPr marL="228600" marR="0" lvl="0" indent="-228600" algn="just" rtl="0">
+              <a:lnSpc>
+                <a:spcPct val="95000"/>
+              </a:lnSpc>
+              <a:spcBef>
+                <a:spcPts val="0"/>
+              </a:spcBef>
+              <a:spcAft>
+                <a:spcPts val="0"/>
+              </a:spcAft>
+              <a:buClr>
+                <a:schemeClr val="dk1"/>
+              </a:buClr>
+              <a:buSzPct val="90000"/>
+              <a:buFont typeface="+mj-lt"/>
+              <a:buAutoNum type="alphaUcPeriod"/>
+            </a:pPr>
+            <a:r>
+              <a:rPr lang="es-MX" sz="1100" dirty="0">
+                <a:solidFill>
+                  <a:schemeClr val="tx1"/>
+                </a:solidFill>
+                <a:latin typeface="+mn-lt"/>
+                <a:ea typeface="Encode Sans Thin"/>
+                <a:cs typeface="Encode Sans Thin"/>
+                <a:sym typeface="Encode Sans ExtraLight"/>
+              </a:rPr>
+              <a:t>Intentar sustituir los </a:t>
+            </a:r>
+            <a:r>
+              <a:rPr lang="es-MX" sz="1100" i="1" dirty="0" err="1">
+                <a:solidFill>
+                  <a:schemeClr val="tx1"/>
+                </a:solidFill>
+                <a:latin typeface="+mn-lt"/>
+                <a:ea typeface="Encode Sans Thin"/>
+                <a:cs typeface="Encode Sans Thin"/>
+                <a:sym typeface="Encode Sans ExtraLight"/>
+              </a:rPr>
+              <a:t>outliers</a:t>
+            </a:r>
+            <a:r>
+              <a:rPr lang="es-MX" sz="1100" i="1" dirty="0">
+                <a:solidFill>
+                  <a:schemeClr val="tx1"/>
+                </a:solidFill>
+                <a:latin typeface="+mn-lt"/>
+                <a:ea typeface="Encode Sans Thin"/>
+                <a:cs typeface="Encode Sans Thin"/>
+                <a:sym typeface="Encode Sans ExtraLight"/>
+              </a:rPr>
+              <a:t> </a:t>
+            </a:r>
+            <a:r>
+              <a:rPr lang="es-MX" sz="1100" dirty="0">
+                <a:solidFill>
+                  <a:schemeClr val="tx1"/>
+                </a:solidFill>
+                <a:latin typeface="+mn-lt"/>
+                <a:ea typeface="Encode Sans Thin"/>
+                <a:cs typeface="Encode Sans Thin"/>
+                <a:sym typeface="Encode Sans ExtraLight"/>
+              </a:rPr>
+              <a:t>por valores como promedios </a:t>
+            </a:r>
+          </a:p>
+          <a:p>
+            <a:pPr marL="228600" marR="0" lvl="0" indent="-228600" algn="just" rtl="0">
+              <a:lnSpc>
+                <a:spcPct val="95000"/>
+              </a:lnSpc>
+              <a:spcBef>
+                <a:spcPts val="0"/>
+              </a:spcBef>
+              <a:spcAft>
+                <a:spcPts val="0"/>
+              </a:spcAft>
+              <a:buClr>
+                <a:schemeClr val="dk1"/>
+              </a:buClr>
+              <a:buSzPct val="90000"/>
+              <a:buFont typeface="+mj-lt"/>
+              <a:buAutoNum type="alphaUcPeriod"/>
+            </a:pPr>
+            <a:r>
+              <a:rPr lang="es-MX" sz="1100" dirty="0">
+                <a:solidFill>
+                  <a:schemeClr val="tx1"/>
+                </a:solidFill>
+                <a:latin typeface="+mn-lt"/>
+                <a:ea typeface="Encode Sans Thin"/>
+                <a:cs typeface="Encode Sans Thin"/>
+                <a:sym typeface="Encode Sans ExtraLight"/>
+              </a:rPr>
+              <a:t>No tomar en cuenta los </a:t>
+            </a:r>
+            <a:r>
+              <a:rPr lang="es-MX" sz="1100" i="1" dirty="0" err="1">
+                <a:solidFill>
+                  <a:schemeClr val="tx1"/>
+                </a:solidFill>
+                <a:latin typeface="+mn-lt"/>
+                <a:ea typeface="Encode Sans Thin"/>
+                <a:cs typeface="Encode Sans Thin"/>
+                <a:sym typeface="Encode Sans ExtraLight"/>
+              </a:rPr>
+              <a:t>outliers</a:t>
+            </a:r>
+            <a:r>
+              <a:rPr lang="es-MX" sz="1100" i="1" dirty="0">
+                <a:solidFill>
+                  <a:schemeClr val="tx1"/>
+                </a:solidFill>
+                <a:latin typeface="+mn-lt"/>
+                <a:ea typeface="Encode Sans Thin"/>
+                <a:cs typeface="Encode Sans Thin"/>
+                <a:sym typeface="Encode Sans ExtraLight"/>
+              </a:rPr>
+              <a:t> </a:t>
+            </a:r>
+            <a:r>
+              <a:rPr lang="es-MX" sz="1100" dirty="0">
+                <a:solidFill>
+                  <a:schemeClr val="tx1"/>
+                </a:solidFill>
+                <a:latin typeface="+mn-lt"/>
+                <a:ea typeface="Encode Sans Thin"/>
+                <a:cs typeface="Encode Sans Thin"/>
+                <a:sym typeface="Encode Sans ExtraLight"/>
+              </a:rPr>
+              <a:t>para el entrenamiento del modelo </a:t>
+            </a:r>
+          </a:p>
+          <a:p>
+            <a:pPr marL="228600" marR="0" lvl="0" indent="-228600" algn="just" rtl="0">
+              <a:lnSpc>
+                <a:spcPct val="95000"/>
+              </a:lnSpc>
+              <a:spcBef>
+                <a:spcPts val="0"/>
+              </a:spcBef>
+              <a:spcAft>
+                <a:spcPts val="0"/>
+              </a:spcAft>
+              <a:buClr>
+                <a:schemeClr val="dk1"/>
+              </a:buClr>
+              <a:buSzPts val="1200"/>
+              <a:buFont typeface="Times New Roman"/>
+              <a:buAutoNum type="alphaUcPeriod"/>
+            </a:pPr>
+            <a:endParaRPr lang="es-MX" sz="1100" dirty="0">
               <a:solidFill>
-                <a:schemeClr val="dk1"/>
+                <a:schemeClr val="tx1"/>
               </a:solidFill>
-              <a:latin typeface="Encode Sans Thin"/>
+              <a:latin typeface="+mn-lt"/>
               <a:ea typeface="Encode Sans Thin"/>
               <a:cs typeface="Encode Sans Thin"/>
-              <a:sym typeface="Encode Sans Thin"/>
+              <a:sym typeface="Encode Sans ExtraLight"/>
             </a:endParaRPr>
           </a:p>
         </p:txBody>
@@ -15134,8 +15448,8 @@
         </p:nvSpPr>
         <p:spPr>
           <a:xfrm>
-            <a:off x="378293" y="10039441"/>
-            <a:ext cx="4357658" cy="666724"/>
+            <a:off x="378293" y="9986101"/>
+            <a:ext cx="4357658" cy="820228"/>
           </a:xfrm>
           <a:prstGeom prst="rect">
             <a:avLst/>
@@ -15178,7 +15492,7 @@
                 <a:cs typeface="Encode Sans ExtraLight"/>
                 <a:sym typeface="Encode Sans ExtraLight"/>
               </a:rPr>
-              <a:t>De igual manera se llevó a cabo un pronóstico de los mismos 12 meses usando los modelos de series de tiempo de ARIMA  con base en los resultados de las gráficas de ACF &amp; PACF </a:t>
+              <a:t>De igual manera se llevó a cabo un pronóstico de los mismos 12 meses usando los modelos de series de tiempo de ARIMA (Utilizando datos de 201 meses como ‘datos de entrenamiento’) con base en los resultados de las gráficas de ACF &amp; PACF </a:t>
             </a:r>
           </a:p>
           <a:p>
@@ -15226,7 +15540,7 @@
         <p:spPr>
           <a:xfrm>
             <a:off x="5025391" y="12421859"/>
-            <a:ext cx="4357658" cy="1412118"/>
+            <a:ext cx="4357658" cy="1860446"/>
           </a:xfrm>
           <a:prstGeom prst="rect">
             <a:avLst/>
@@ -15358,6 +15672,41 @@
               </a:rPr>
               <a:t>https://arauto.readthedocs.io/en/latest/how_to_choose_terms.html</a:t>
             </a:r>
+            <a:endParaRPr lang="es-ES" sz="900" dirty="0">
+              <a:solidFill>
+                <a:schemeClr val="tx1"/>
+              </a:solidFill>
+              <a:latin typeface="+mn-lt"/>
+            </a:endParaRPr>
+          </a:p>
+          <a:p>
+            <a:pPr marL="127635" marR="0">
+              <a:lnSpc>
+                <a:spcPct val="107000"/>
+              </a:lnSpc>
+              <a:spcBef>
+                <a:spcPts val="795"/>
+              </a:spcBef>
+              <a:spcAft>
+                <a:spcPts val="0"/>
+              </a:spcAft>
+            </a:pPr>
+            <a:r>
+              <a:rPr lang="es-MX" sz="900" dirty="0">
+                <a:solidFill>
+                  <a:schemeClr val="tx1"/>
+                </a:solidFill>
+                <a:latin typeface="+mn-lt"/>
+                <a:hlinkClick r:id="rId7">
+                  <a:extLst>
+                    <a:ext uri="{A12FA001-AC4F-418D-AE19-62706E023703}">
+                      <ahyp:hlinkClr xmlns:ahyp="http://schemas.microsoft.com/office/drawing/2018/hyperlinkcolor" val="tx"/>
+                    </a:ext>
+                  </a:extLst>
+                </a:hlinkClick>
+              </a:rPr>
+              <a:t>SENER | Sistema de Información Energética | Demanda Interna de Gas Natural por Estado Sector Eléctrico (energia.gob.mx)</a:t>
+            </a:r>
             <a:endParaRPr lang="es-MX" sz="900" dirty="0">
               <a:solidFill>
                 <a:schemeClr val="tx1"/>
@@ -15455,7 +15804,7 @@
         </p:nvSpPr>
         <p:spPr>
           <a:xfrm>
-            <a:off x="378293" y="5823142"/>
+            <a:off x="378293" y="5746942"/>
             <a:ext cx="9015465" cy="637485"/>
           </a:xfrm>
           <a:prstGeom prst="rect">
@@ -15514,31 +15863,13 @@
                 </a:solidFill>
                 <a:latin typeface="+mn-lt"/>
               </a:rPr>
-              <a:t>” o retraso determinado, es decir, se puede entender como una especie de modelos lineales donde los predictores son los valores significativos de la misma variable en el pasado, más un término de error o “ruido blanco” que da cuenta por la propia aleatoriedad del fenómeno, se pueden modelar mediante procesos llamados Auto-Regresivos y de Medias </a:t>
-            </a:r>
-            <a:r>
-              <a:rPr lang="es-MX" sz="1000" dirty="0" err="1">
-                <a:solidFill>
-                  <a:schemeClr val="tx1"/>
-                </a:solidFill>
-                <a:latin typeface="+mn-lt"/>
-              </a:rPr>
-              <a:t>Moviles</a:t>
-            </a:r>
-            <a:r>
-              <a:rPr lang="es-MX" sz="1000" dirty="0">
-                <a:solidFill>
-                  <a:schemeClr val="tx1"/>
-                </a:solidFill>
-                <a:latin typeface="+mn-lt"/>
-              </a:rPr>
-              <a:t> (ARIMA) </a:t>
+              <a:t>” o retraso determinado, es decir, se puede entender como una especie de modelos lineales donde los predictores son los valores significativos de la misma variable en el tiempo, más un término de error o “ruido blanco” que da cuenta por la propia aleatoriedad del fenómeno, se pueden modelar mediante procesos llamados Auto-Regresivos y de Medias Móviles (ARIMA) </a:t>
             </a:r>
           </a:p>
         </p:txBody>
       </p:sp>
-      <mc:AlternateContent xmlns:mc="http://schemas.openxmlformats.org/markup-compatibility/2006" xmlns:a14="http://schemas.microsoft.com/office/drawing/2010/main">
-        <mc:Choice Requires="a14">
+      <mc:AlternateContent xmlns:mc="http://schemas.openxmlformats.org/markup-compatibility/2006">
+        <mc:Choice xmlns:a14="http://schemas.microsoft.com/office/drawing/2010/main" Requires="a14">
           <p:sp>
             <p:nvSpPr>
               <p:cNvPr id="4" name="Google Shape;89;p1">
@@ -15553,7 +15884,7 @@
             </p:nvSpPr>
             <p:spPr>
               <a:xfrm>
-                <a:off x="2482359" y="6288130"/>
+                <a:off x="2482359" y="6250030"/>
                 <a:ext cx="4332536" cy="1002970"/>
               </a:xfrm>
               <a:prstGeom prst="rect">
@@ -16324,7 +16655,7 @@
             </p:txBody>
           </p:sp>
         </mc:Choice>
-        <mc:Fallback xmlns="">
+        <mc:Fallback>
           <p:sp>
             <p:nvSpPr>
               <p:cNvPr id="4" name="Google Shape;89;p1">
@@ -16341,16 +16672,16 @@
             </p:nvSpPr>
             <p:spPr>
               <a:xfrm>
-                <a:off x="2482359" y="6288130"/>
+                <a:off x="2482359" y="6250030"/>
                 <a:ext cx="4332536" cy="1002970"/>
               </a:xfrm>
               <a:prstGeom prst="rect">
                 <a:avLst/>
               </a:prstGeom>
               <a:blipFill>
-                <a:blip r:embed="rId7"/>
+                <a:blip r:embed="rId8"/>
                 <a:stretch>
-                  <a:fillRect l="-422" t="-2439"/>
+                  <a:fillRect l="-422" t="-2424"/>
                 </a:stretch>
               </a:blipFill>
               <a:ln>
@@ -16372,8 +16703,8 @@
           </p:sp>
         </mc:Fallback>
       </mc:AlternateContent>
-      <mc:AlternateContent xmlns:mc="http://schemas.openxmlformats.org/markup-compatibility/2006" xmlns:a14="http://schemas.microsoft.com/office/drawing/2010/main">
-        <mc:Choice Requires="a14">
+      <mc:AlternateContent xmlns:mc="http://schemas.openxmlformats.org/markup-compatibility/2006">
+        <mc:Choice xmlns:a14="http://schemas.microsoft.com/office/drawing/2010/main" Requires="a14">
           <p:sp>
             <p:nvSpPr>
               <p:cNvPr id="11" name="TextBox 10">
@@ -16388,7 +16719,7 @@
             </p:nvSpPr>
             <p:spPr>
               <a:xfrm>
-                <a:off x="2442050" y="5005107"/>
+                <a:off x="2442050" y="4951767"/>
                 <a:ext cx="4886960" cy="750205"/>
               </a:xfrm>
               <a:prstGeom prst="rect">
@@ -16736,22 +17067,13 @@
                   <a:buSzPts val="1200"/>
                 </a:pPr>
                 <a:r>
-                  <a:rPr lang="en-US" sz="900" dirty="0" err="1">
+                  <a:rPr lang="es-MX" sz="900" dirty="0">
                     <a:solidFill>
                       <a:schemeClr val="dk1"/>
                     </a:solidFill>
                     <a:latin typeface="+mn-lt"/>
                   </a:rPr>
-                  <a:t>Donde</a:t>
-                </a:r>
-                <a:r>
-                  <a:rPr lang="en-US" sz="900" dirty="0">
-                    <a:solidFill>
-                      <a:schemeClr val="dk1"/>
-                    </a:solidFill>
-                    <a:latin typeface="+mn-lt"/>
-                  </a:rPr>
-                  <a:t>: </a:t>
+                  <a:t>Donde: </a:t>
                 </a:r>
               </a:p>
               <a:p>
@@ -16765,31 +17087,13 @@
                   <a:buSzPts val="1200"/>
                 </a:pPr>
                 <a:r>
-                  <a:rPr lang="en-US" sz="900" dirty="0">
+                  <a:rPr lang="es-MX" sz="900" dirty="0">
                     <a:solidFill>
                       <a:schemeClr val="dk1"/>
                     </a:solidFill>
                     <a:latin typeface="+mn-lt"/>
                   </a:rPr>
-                  <a:t>y: Valor a </a:t>
-                </a:r>
-                <a:r>
-                  <a:rPr lang="en-US" sz="900" dirty="0" err="1">
-                    <a:solidFill>
-                      <a:schemeClr val="dk1"/>
-                    </a:solidFill>
-                    <a:latin typeface="+mn-lt"/>
-                  </a:rPr>
-                  <a:t>pronosticar</a:t>
-                </a:r>
-                <a:r>
-                  <a:rPr lang="en-US" sz="900" dirty="0">
-                    <a:solidFill>
-                      <a:schemeClr val="dk1"/>
-                    </a:solidFill>
-                    <a:latin typeface="+mn-lt"/>
-                  </a:rPr>
-                  <a:t> </a:t>
+                  <a:t>y: Valor a pronosticar </a:t>
                 </a:r>
               </a:p>
               <a:p>
@@ -16803,7 +17107,7 @@
                   <a:buSzPts val="1200"/>
                 </a:pPr>
                 <a:r>
-                  <a:rPr lang="en-US" sz="900" b="0" i="0" dirty="0">
+                  <a:rPr lang="es-MX" sz="900" b="0" i="0" dirty="0">
                     <a:solidFill>
                       <a:schemeClr val="dk1"/>
                     </a:solidFill>
@@ -16811,95 +17115,7 @@
                     <a:ea typeface="Cambria Math" panose="02040503050406030204" pitchFamily="18" charset="0"/>
                     <a:sym typeface="Arial"/>
                   </a:rPr>
-                  <a:t>𝛽: </a:t>
-                </a:r>
-                <a:r>
-                  <a:rPr lang="en-US" sz="900" b="0" i="0" dirty="0" err="1">
-                    <a:solidFill>
-                      <a:schemeClr val="dk1"/>
-                    </a:solidFill>
-                    <a:latin typeface="+mn-lt"/>
-                    <a:ea typeface="Cambria Math" panose="02040503050406030204" pitchFamily="18" charset="0"/>
-                    <a:sym typeface="Arial"/>
-                  </a:rPr>
-                  <a:t>Parámetros</a:t>
-                </a:r>
-                <a:r>
-                  <a:rPr lang="en-US" sz="900" b="0" i="0" dirty="0">
-                    <a:solidFill>
-                      <a:schemeClr val="dk1"/>
-                    </a:solidFill>
-                    <a:latin typeface="+mn-lt"/>
-                    <a:ea typeface="Cambria Math" panose="02040503050406030204" pitchFamily="18" charset="0"/>
-                    <a:sym typeface="Arial"/>
-                  </a:rPr>
-                  <a:t> a </a:t>
-                </a:r>
-                <a:r>
-                  <a:rPr lang="en-US" sz="900" b="0" i="0" dirty="0" err="1">
-                    <a:solidFill>
-                      <a:schemeClr val="dk1"/>
-                    </a:solidFill>
-                    <a:latin typeface="+mn-lt"/>
-                    <a:ea typeface="Cambria Math" panose="02040503050406030204" pitchFamily="18" charset="0"/>
-                    <a:sym typeface="Arial"/>
-                  </a:rPr>
-                  <a:t>ajustar</a:t>
-                </a:r>
-                <a:r>
-                  <a:rPr lang="en-US" sz="900" b="0" i="0" dirty="0">
-                    <a:solidFill>
-                      <a:schemeClr val="dk1"/>
-                    </a:solidFill>
-                    <a:latin typeface="+mn-lt"/>
-                    <a:ea typeface="Cambria Math" panose="02040503050406030204" pitchFamily="18" charset="0"/>
-                    <a:sym typeface="Arial"/>
-                  </a:rPr>
-                  <a:t> para </a:t>
-                </a:r>
-                <a:r>
-                  <a:rPr lang="en-US" sz="900" b="0" i="0" dirty="0" err="1">
-                    <a:solidFill>
-                      <a:schemeClr val="dk1"/>
-                    </a:solidFill>
-                    <a:latin typeface="+mn-lt"/>
-                    <a:ea typeface="Cambria Math" panose="02040503050406030204" pitchFamily="18" charset="0"/>
-                    <a:sym typeface="Arial"/>
-                  </a:rPr>
-                  <a:t>cada</a:t>
-                </a:r>
-                <a:r>
-                  <a:rPr lang="en-US" sz="900" b="0" i="0" dirty="0">
-                    <a:solidFill>
-                      <a:schemeClr val="dk1"/>
-                    </a:solidFill>
-                    <a:latin typeface="+mn-lt"/>
-                    <a:ea typeface="Cambria Math" panose="02040503050406030204" pitchFamily="18" charset="0"/>
-                    <a:sym typeface="Arial"/>
-                  </a:rPr>
-                  <a:t> </a:t>
-                </a:r>
-                <a:r>
-                  <a:rPr lang="en-US" sz="900" b="0" i="0" dirty="0" err="1">
-                    <a:solidFill>
-                      <a:schemeClr val="dk1"/>
-                    </a:solidFill>
-                    <a:latin typeface="+mn-lt"/>
-                    <a:ea typeface="Cambria Math" panose="02040503050406030204" pitchFamily="18" charset="0"/>
-                    <a:sym typeface="Arial"/>
-                  </a:rPr>
-                  <a:t>caso</a:t>
-                </a:r>
-                <a:r>
-                  <a:rPr lang="en-US" sz="900" b="0" i="0" dirty="0">
-                    <a:solidFill>
-                      <a:schemeClr val="dk1"/>
-                    </a:solidFill>
-                    <a:latin typeface="+mn-lt"/>
-                    <a:ea typeface="Cambria Math" panose="02040503050406030204" pitchFamily="18" charset="0"/>
-                    <a:sym typeface="Arial"/>
-                  </a:rPr>
-                  <a:t> </a:t>
+                  <a:t>𝛽: Parámetros a ajustar para cada caso </a:t>
                 </a:r>
               </a:p>
               <a:p>
@@ -16913,7 +17129,7 @@
                   <a:buSzPts val="1200"/>
                 </a:pPr>
                 <a:r>
-                  <a:rPr lang="en-US" sz="900" b="0" i="0" dirty="0">
+                  <a:rPr lang="es-MX" sz="900" b="0" i="0" dirty="0">
                     <a:solidFill>
                       <a:schemeClr val="dk1"/>
                     </a:solidFill>
@@ -16921,76 +17137,13 @@
                     <a:ea typeface="Cambria Math" panose="02040503050406030204" pitchFamily="18" charset="0"/>
                     <a:sym typeface="Arial"/>
                   </a:rPr>
-                  <a:t>Xi: variables </a:t>
+                  <a:t>Xi: variables predictoras independientes entre si</a:t>
                 </a:r>
-                <a:r>
-                  <a:rPr lang="en-US" sz="900" b="0" i="0" dirty="0" err="1">
-                    <a:solidFill>
-                      <a:schemeClr val="dk1"/>
-                    </a:solidFill>
-                    <a:latin typeface="+mn-lt"/>
-                    <a:ea typeface="Cambria Math" panose="02040503050406030204" pitchFamily="18" charset="0"/>
-                    <a:sym typeface="Arial"/>
-                  </a:rPr>
-                  <a:t>predictoras</a:t>
-                </a:r>
-                <a:r>
-                  <a:rPr lang="en-US" sz="900" b="0" i="0" dirty="0">
-                    <a:solidFill>
-                      <a:schemeClr val="dk1"/>
-                    </a:solidFill>
-                    <a:latin typeface="+mn-lt"/>
-                    <a:ea typeface="Cambria Math" panose="02040503050406030204" pitchFamily="18" charset="0"/>
-                    <a:sym typeface="Arial"/>
-                  </a:rPr>
-                  <a:t> </a:t>
-                </a:r>
-                <a:r>
-                  <a:rPr lang="en-US" sz="900" b="0" i="0" dirty="0" err="1">
-                    <a:solidFill>
-                      <a:schemeClr val="dk1"/>
-                    </a:solidFill>
-                    <a:latin typeface="+mn-lt"/>
-                    <a:ea typeface="Cambria Math" panose="02040503050406030204" pitchFamily="18" charset="0"/>
-                    <a:sym typeface="Arial"/>
-                  </a:rPr>
-                  <a:t>independientes</a:t>
-                </a:r>
-                <a:r>
-                  <a:rPr lang="en-US" sz="900" b="0" i="0" dirty="0">
-                    <a:solidFill>
-                      <a:schemeClr val="dk1"/>
-                    </a:solidFill>
-                    <a:latin typeface="+mn-lt"/>
-                    <a:ea typeface="Cambria Math" panose="02040503050406030204" pitchFamily="18" charset="0"/>
-                    <a:sym typeface="Arial"/>
-                  </a:rPr>
-                  <a:t> entre </a:t>
-                </a:r>
-                <a:r>
-                  <a:rPr lang="en-US" sz="900" b="0" i="0" dirty="0" err="1">
-                    <a:solidFill>
-                      <a:schemeClr val="dk1"/>
-                    </a:solidFill>
-                    <a:latin typeface="+mn-lt"/>
-                    <a:ea typeface="Cambria Math" panose="02040503050406030204" pitchFamily="18" charset="0"/>
-                    <a:sym typeface="Arial"/>
-                  </a:rPr>
-                  <a:t>si</a:t>
-                </a:r>
-                <a:endParaRPr lang="en-US" sz="900" b="0" i="0" dirty="0">
-                  <a:solidFill>
-                    <a:schemeClr val="dk1"/>
-                  </a:solidFill>
-                  <a:latin typeface="+mn-lt"/>
-                  <a:ea typeface="Cambria Math" panose="02040503050406030204" pitchFamily="18" charset="0"/>
-                  <a:sym typeface="Arial"/>
-                </a:endParaRPr>
               </a:p>
             </p:txBody>
           </p:sp>
         </mc:Choice>
-        <mc:Fallback xmlns="">
+        <mc:Fallback>
           <p:sp>
             <p:nvSpPr>
               <p:cNvPr id="11" name="TextBox 10">
@@ -17007,16 +17160,16 @@
             </p:nvSpPr>
             <p:spPr>
               <a:xfrm>
-                <a:off x="2442050" y="5005107"/>
+                <a:off x="2442050" y="4951767"/>
                 <a:ext cx="4886960" cy="750205"/>
               </a:xfrm>
               <a:prstGeom prst="rect">
                 <a:avLst/>
               </a:prstGeom>
               <a:blipFill>
-                <a:blip r:embed="rId8"/>
+                <a:blip r:embed="rId9"/>
                 <a:stretch>
-                  <a:fillRect t="-813" b="-3252"/>
+                  <a:fillRect b="-3252"/>
                 </a:stretch>
               </a:blipFill>
             </p:spPr>
@@ -17050,13 +17203,13 @@
           <p:nvPr>
             <p:extLst>
               <p:ext uri="{D42A27DB-BD31-4B8C-83A1-F6EECF244321}">
-                <p14:modId xmlns:p14="http://schemas.microsoft.com/office/powerpoint/2010/main" val="2182818402"/>
+                <p14:modId xmlns:p14="http://schemas.microsoft.com/office/powerpoint/2010/main" val="1723477623"/>
               </p:ext>
             </p:extLst>
           </p:nvPr>
         </p:nvGraphicFramePr>
         <p:xfrm>
-          <a:off x="514086" y="10728229"/>
+          <a:off x="514086" y="10687081"/>
           <a:ext cx="4086072" cy="530676"/>
         </p:xfrm>
         <a:graphic>
@@ -18461,7 +18614,7 @@
           <p:nvPr>
             <p:extLst>
               <p:ext uri="{D42A27DB-BD31-4B8C-83A1-F6EECF244321}">
-                <p14:modId xmlns:p14="http://schemas.microsoft.com/office/powerpoint/2010/main" val="2368849363"/>
+                <p14:modId xmlns:p14="http://schemas.microsoft.com/office/powerpoint/2010/main" val="3734856271"/>
               </p:ext>
             </p:extLst>
           </p:nvPr>
@@ -19057,7 +19210,7 @@
                           </a:solidFill>
                           <a:effectLst/>
                         </a:rPr>
-                        <a:t>14.5%</a:t>
+                        <a:t>15.0%</a:t>
                       </a:r>
                       <a:endParaRPr lang="es-MX" sz="500" b="0" dirty="0">
                         <a:solidFill>
@@ -19198,8 +19351,8 @@
         </p:nvSpPr>
         <p:spPr>
           <a:xfrm>
-            <a:off x="423178" y="11448761"/>
-            <a:ext cx="4357658" cy="973731"/>
+            <a:off x="306263" y="11847628"/>
+            <a:ext cx="4481669" cy="973731"/>
           </a:xfrm>
           <a:prstGeom prst="rect">
             <a:avLst/>
@@ -19362,7 +19515,7 @@
           <p:nvPr/>
         </p:nvPicPr>
         <p:blipFill>
-          <a:blip r:embed="rId9"/>
+          <a:blip r:embed="rId10"/>
           <a:stretch>
             <a:fillRect/>
           </a:stretch>
@@ -19392,7 +19545,7 @@
         <p:spPr>
           <a:xfrm>
             <a:off x="400975" y="7652662"/>
-            <a:ext cx="4481669" cy="513220"/>
+            <a:ext cx="4481669" cy="666724"/>
           </a:xfrm>
           <a:prstGeom prst="rect">
             <a:avLst/>
@@ -19435,7 +19588,7 @@
                 <a:cs typeface="Encode Sans ExtraLight"/>
                 <a:sym typeface="Encode Sans ExtraLight"/>
               </a:rPr>
-              <a:t>Se muestra la serie histórica de demanda de gas natural en el sector eléctrico en y las funciones ACF y PACF de la serie sin diferenciar </a:t>
+              <a:t>Se muestra la serie histórica de demanda de gas natural en el sector eléctrico en México y las funciones ACF y PACF de la serie sin diferenciar </a:t>
             </a:r>
           </a:p>
           <a:p>
@@ -19483,13 +19636,13 @@
           <p:nvPr>
             <p:extLst>
               <p:ext uri="{D42A27DB-BD31-4B8C-83A1-F6EECF244321}">
-                <p14:modId xmlns:p14="http://schemas.microsoft.com/office/powerpoint/2010/main" val="3270835164"/>
+                <p14:modId xmlns:p14="http://schemas.microsoft.com/office/powerpoint/2010/main" val="3068993873"/>
               </p:ext>
             </p:extLst>
           </p:nvPr>
         </p:nvGraphicFramePr>
         <p:xfrm>
-          <a:off x="693339" y="12369706"/>
+          <a:off x="693339" y="11358237"/>
           <a:ext cx="3727563" cy="407224"/>
         </p:xfrm>
         <a:graphic>
@@ -19841,7 +19994,7 @@
                           </a:solidFill>
                           <a:effectLst/>
                         </a:rPr>
-                        <a:t>17.5%</a:t>
+                        <a:t>18.5%</a:t>
                       </a:r>
                       <a:endParaRPr lang="es-MX" sz="500" b="0" dirty="0">
                         <a:solidFill>
@@ -20076,7 +20229,7 @@
                           </a:solidFill>
                           <a:effectLst/>
                         </a:rPr>
-                        <a:t>15.5%</a:t>
+                        <a:t>16.5%</a:t>
                       </a:r>
                       <a:endParaRPr lang="es-MX" sz="500" b="0" dirty="0">
                         <a:solidFill>
@@ -20221,15 +20374,15 @@
           <p:nvPr/>
         </p:nvPicPr>
         <p:blipFill>
-          <a:blip r:embed="rId10"/>
+          <a:blip r:embed="rId11"/>
           <a:stretch>
             <a:fillRect/>
           </a:stretch>
         </p:blipFill>
         <p:spPr>
           <a:xfrm>
-            <a:off x="2700913" y="13146141"/>
-            <a:ext cx="1362738" cy="841004"/>
+            <a:off x="2819167" y="13505298"/>
+            <a:ext cx="1126230" cy="695045"/>
           </a:xfrm>
           <a:prstGeom prst="rect">
             <a:avLst/>
@@ -20251,7 +20404,7 @@
           <p:nvPr/>
         </p:nvPicPr>
         <p:blipFill>
-          <a:blip r:embed="rId11"/>
+          <a:blip r:embed="rId12"/>
           <a:stretch>
             <a:fillRect/>
           </a:stretch>
@@ -20281,7 +20434,7 @@
           <p:nvPr/>
         </p:nvPicPr>
         <p:blipFill>
-          <a:blip r:embed="rId12"/>
+          <a:blip r:embed="rId13"/>
           <a:stretch>
             <a:fillRect/>
           </a:stretch>
@@ -20311,21 +20464,1029 @@
           <p:nvPr/>
         </p:nvPicPr>
         <p:blipFill>
-          <a:blip r:embed="rId13"/>
+          <a:blip r:embed="rId14"/>
           <a:stretch>
             <a:fillRect/>
           </a:stretch>
         </p:blipFill>
         <p:spPr>
           <a:xfrm>
-            <a:off x="961348" y="13145044"/>
-            <a:ext cx="1362738" cy="841004"/>
+            <a:off x="1079602" y="13505298"/>
+            <a:ext cx="1126230" cy="695045"/>
           </a:xfrm>
           <a:prstGeom prst="rect">
             <a:avLst/>
           </a:prstGeom>
         </p:spPr>
       </p:pic>
+      <p:graphicFrame>
+        <p:nvGraphicFramePr>
+          <p:cNvPr id="15" name="Table 14">
+            <a:extLst>
+              <a:ext uri="{FF2B5EF4-FFF2-40B4-BE49-F238E27FC236}">
+                <a16:creationId xmlns:a16="http://schemas.microsoft.com/office/drawing/2014/main" id="{F9CDF176-9F59-52E3-6189-2A63A4693605}"/>
+              </a:ext>
+            </a:extLst>
+          </p:cNvPr>
+          <p:cNvGraphicFramePr>
+            <a:graphicFrameLocks noGrp="1"/>
+          </p:cNvGraphicFramePr>
+          <p:nvPr>
+            <p:extLst>
+              <p:ext uri="{D42A27DB-BD31-4B8C-83A1-F6EECF244321}">
+                <p14:modId xmlns:p14="http://schemas.microsoft.com/office/powerpoint/2010/main" val="3461205540"/>
+              </p:ext>
+            </p:extLst>
+          </p:nvPr>
+        </p:nvGraphicFramePr>
+        <p:xfrm>
+          <a:off x="738226" y="12745413"/>
+          <a:ext cx="3727563" cy="712024"/>
+        </p:xfrm>
+        <a:graphic>
+          <a:graphicData uri="http://schemas.openxmlformats.org/drawingml/2006/table">
+            <a:tbl>
+              <a:tblPr firstRow="1" firstCol="1" lastRow="1" lastCol="1" bandRow="1" bandCol="1">
+                <a:tableStyleId>{073A0DAA-6AF3-43AB-8588-CEC1D06C72B9}</a:tableStyleId>
+              </a:tblPr>
+              <a:tblGrid>
+                <a:gridCol w="1775540">
+                  <a:extLst>
+                    <a:ext uri="{9D8B030D-6E8A-4147-A177-3AD203B41FA5}">
+                      <a16:colId xmlns:a16="http://schemas.microsoft.com/office/drawing/2014/main" val="3883179358"/>
+                    </a:ext>
+                  </a:extLst>
+                </a:gridCol>
+                <a:gridCol w="617220">
+                  <a:extLst>
+                    <a:ext uri="{9D8B030D-6E8A-4147-A177-3AD203B41FA5}">
+                      <a16:colId xmlns:a16="http://schemas.microsoft.com/office/drawing/2014/main" val="3238939105"/>
+                    </a:ext>
+                  </a:extLst>
+                </a:gridCol>
+                <a:gridCol w="1334803">
+                  <a:extLst>
+                    <a:ext uri="{9D8B030D-6E8A-4147-A177-3AD203B41FA5}">
+                      <a16:colId xmlns:a16="http://schemas.microsoft.com/office/drawing/2014/main" val="3179396712"/>
+                    </a:ext>
+                  </a:extLst>
+                </a:gridCol>
+              </a:tblGrid>
+              <a:tr h="67256">
+                <a:tc>
+                  <a:txBody>
+                    <a:bodyPr/>
+                    <a:lstStyle/>
+                    <a:p>
+                      <a:pPr marL="0" marR="0">
+                        <a:spcBef>
+                          <a:spcPts val="0"/>
+                        </a:spcBef>
+                        <a:spcAft>
+                          <a:spcPts val="0"/>
+                        </a:spcAft>
+                      </a:pPr>
+                      <a:r>
+                        <a:rPr lang="es-ES" sz="500" dirty="0">
+                          <a:solidFill>
+                            <a:schemeClr val="tx1"/>
+                          </a:solidFill>
+                          <a:effectLst/>
+                        </a:rPr>
+                        <a:t> Modelo</a:t>
+                      </a:r>
+                      <a:endParaRPr lang="es-MX" sz="500" dirty="0">
+                        <a:solidFill>
+                          <a:schemeClr val="tx1"/>
+                        </a:solidFill>
+                        <a:effectLst/>
+                        <a:latin typeface="Calibri" panose="020F0502020204030204" pitchFamily="34" charset="0"/>
+                        <a:ea typeface="Calibri" panose="020F0502020204030204" pitchFamily="34" charset="0"/>
+                        <a:cs typeface="Times New Roman" panose="02020603050405020304" pitchFamily="18" charset="0"/>
+                      </a:endParaRPr>
+                    </a:p>
+                  </a:txBody>
+                  <a:tcPr marL="0" marR="0" marT="0" marB="0">
+                    <a:lnL w="12700" cap="flat" cmpd="sng" algn="ctr">
+                      <a:solidFill>
+                        <a:schemeClr val="tx1"/>
+                      </a:solidFill>
+                      <a:prstDash val="solid"/>
+                      <a:round/>
+                      <a:headEnd type="none" w="med" len="med"/>
+                      <a:tailEnd type="none" w="med" len="med"/>
+                    </a:lnL>
+                    <a:lnR w="12700" cap="flat" cmpd="sng" algn="ctr">
+                      <a:solidFill>
+                        <a:schemeClr val="tx1"/>
+                      </a:solidFill>
+                      <a:prstDash val="solid"/>
+                      <a:round/>
+                      <a:headEnd type="none" w="med" len="med"/>
+                      <a:tailEnd type="none" w="med" len="med"/>
+                    </a:lnR>
+                    <a:lnT w="12700" cap="flat" cmpd="sng" algn="ctr">
+                      <a:solidFill>
+                        <a:schemeClr val="tx1"/>
+                      </a:solidFill>
+                      <a:prstDash val="solid"/>
+                      <a:round/>
+                      <a:headEnd type="none" w="med" len="med"/>
+                      <a:tailEnd type="none" w="med" len="med"/>
+                    </a:lnT>
+                    <a:lnB w="12700" cap="flat" cmpd="sng" algn="ctr">
+                      <a:solidFill>
+                        <a:schemeClr val="tx1"/>
+                      </a:solidFill>
+                      <a:prstDash val="solid"/>
+                      <a:round/>
+                      <a:headEnd type="none" w="med" len="med"/>
+                      <a:tailEnd type="none" w="med" len="med"/>
+                    </a:lnB>
+                    <a:noFill/>
+                  </a:tcPr>
+                </a:tc>
+                <a:tc>
+                  <a:txBody>
+                    <a:bodyPr/>
+                    <a:lstStyle/>
+                    <a:p>
+                      <a:pPr marL="60325" marR="0">
+                        <a:spcBef>
+                          <a:spcPts val="560"/>
+                        </a:spcBef>
+                        <a:spcAft>
+                          <a:spcPts val="0"/>
+                        </a:spcAft>
+                      </a:pPr>
+                      <a:r>
+                        <a:rPr lang="es-ES" sz="500" dirty="0">
+                          <a:solidFill>
+                            <a:schemeClr val="tx1"/>
+                          </a:solidFill>
+                          <a:effectLst/>
+                          <a:latin typeface="Calibri" panose="020F0502020204030204" pitchFamily="34" charset="0"/>
+                          <a:ea typeface="Calibri" panose="020F0502020204030204" pitchFamily="34" charset="0"/>
+                          <a:cs typeface="Times New Roman" panose="02020603050405020304" pitchFamily="18" charset="0"/>
+                        </a:rPr>
+                        <a:t>MAPE</a:t>
+                      </a:r>
+                      <a:endParaRPr lang="es-MX" sz="500" dirty="0">
+                        <a:solidFill>
+                          <a:schemeClr val="tx1"/>
+                        </a:solidFill>
+                        <a:effectLst/>
+                        <a:latin typeface="Calibri" panose="020F0502020204030204" pitchFamily="34" charset="0"/>
+                        <a:ea typeface="Calibri" panose="020F0502020204030204" pitchFamily="34" charset="0"/>
+                        <a:cs typeface="Times New Roman" panose="02020603050405020304" pitchFamily="18" charset="0"/>
+                      </a:endParaRPr>
+                    </a:p>
+                  </a:txBody>
+                  <a:tcPr marL="0" marR="0" marT="0" marB="0">
+                    <a:lnL w="12700" cap="flat" cmpd="sng" algn="ctr">
+                      <a:solidFill>
+                        <a:schemeClr val="tx1"/>
+                      </a:solidFill>
+                      <a:prstDash val="solid"/>
+                      <a:round/>
+                      <a:headEnd type="none" w="med" len="med"/>
+                      <a:tailEnd type="none" w="med" len="med"/>
+                    </a:lnL>
+                    <a:lnR w="12700" cap="flat" cmpd="sng" algn="ctr">
+                      <a:solidFill>
+                        <a:schemeClr val="tx1"/>
+                      </a:solidFill>
+                      <a:prstDash val="solid"/>
+                      <a:round/>
+                      <a:headEnd type="none" w="med" len="med"/>
+                      <a:tailEnd type="none" w="med" len="med"/>
+                    </a:lnR>
+                    <a:lnT w="12700" cap="flat" cmpd="sng" algn="ctr">
+                      <a:solidFill>
+                        <a:schemeClr val="tx1"/>
+                      </a:solidFill>
+                      <a:prstDash val="solid"/>
+                      <a:round/>
+                      <a:headEnd type="none" w="med" len="med"/>
+                      <a:tailEnd type="none" w="med" len="med"/>
+                    </a:lnT>
+                    <a:lnB w="12700" cap="flat" cmpd="sng" algn="ctr">
+                      <a:solidFill>
+                        <a:schemeClr val="tx1"/>
+                      </a:solidFill>
+                      <a:prstDash val="solid"/>
+                      <a:round/>
+                      <a:headEnd type="none" w="med" len="med"/>
+                      <a:tailEnd type="none" w="med" len="med"/>
+                    </a:lnB>
+                    <a:noFill/>
+                  </a:tcPr>
+                </a:tc>
+                <a:tc>
+                  <a:txBody>
+                    <a:bodyPr/>
+                    <a:lstStyle/>
+                    <a:p>
+                      <a:pPr marL="63500" marR="0">
+                        <a:spcBef>
+                          <a:spcPts val="560"/>
+                        </a:spcBef>
+                        <a:spcAft>
+                          <a:spcPts val="0"/>
+                        </a:spcAft>
+                      </a:pPr>
+                      <a:r>
+                        <a:rPr lang="es-ES" sz="500" dirty="0">
+                          <a:solidFill>
+                            <a:schemeClr val="tx1"/>
+                          </a:solidFill>
+                          <a:effectLst/>
+                          <a:latin typeface="Calibri" panose="020F0502020204030204" pitchFamily="34" charset="0"/>
+                          <a:ea typeface="Calibri" panose="020F0502020204030204" pitchFamily="34" charset="0"/>
+                          <a:cs typeface="Times New Roman" panose="02020603050405020304" pitchFamily="18" charset="0"/>
+                        </a:rPr>
+                        <a:t>Comentario(s)</a:t>
+                      </a:r>
+                      <a:endParaRPr lang="es-MX" sz="500" dirty="0">
+                        <a:solidFill>
+                          <a:schemeClr val="tx1"/>
+                        </a:solidFill>
+                        <a:effectLst/>
+                        <a:latin typeface="Calibri" panose="020F0502020204030204" pitchFamily="34" charset="0"/>
+                        <a:ea typeface="Calibri" panose="020F0502020204030204" pitchFamily="34" charset="0"/>
+                        <a:cs typeface="Times New Roman" panose="02020603050405020304" pitchFamily="18" charset="0"/>
+                      </a:endParaRPr>
+                    </a:p>
+                  </a:txBody>
+                  <a:tcPr marL="0" marR="0" marT="0" marB="0">
+                    <a:lnL w="12700" cap="flat" cmpd="sng" algn="ctr">
+                      <a:solidFill>
+                        <a:schemeClr val="tx1"/>
+                      </a:solidFill>
+                      <a:prstDash val="solid"/>
+                      <a:round/>
+                      <a:headEnd type="none" w="med" len="med"/>
+                      <a:tailEnd type="none" w="med" len="med"/>
+                    </a:lnL>
+                    <a:lnR w="12700" cap="flat" cmpd="sng" algn="ctr">
+                      <a:solidFill>
+                        <a:schemeClr val="tx1"/>
+                      </a:solidFill>
+                      <a:prstDash val="solid"/>
+                      <a:round/>
+                      <a:headEnd type="none" w="med" len="med"/>
+                      <a:tailEnd type="none" w="med" len="med"/>
+                    </a:lnR>
+                    <a:lnT w="12700" cap="flat" cmpd="sng" algn="ctr">
+                      <a:solidFill>
+                        <a:schemeClr val="tx1"/>
+                      </a:solidFill>
+                      <a:prstDash val="solid"/>
+                      <a:round/>
+                      <a:headEnd type="none" w="med" len="med"/>
+                      <a:tailEnd type="none" w="med" len="med"/>
+                    </a:lnT>
+                    <a:lnB w="12700" cap="flat" cmpd="sng" algn="ctr">
+                      <a:solidFill>
+                        <a:schemeClr val="tx1"/>
+                      </a:solidFill>
+                      <a:prstDash val="solid"/>
+                      <a:round/>
+                      <a:headEnd type="none" w="med" len="med"/>
+                      <a:tailEnd type="none" w="med" len="med"/>
+                    </a:lnB>
+                    <a:noFill/>
+                  </a:tcPr>
+                </a:tc>
+                <a:extLst>
+                  <a:ext uri="{0D108BD9-81ED-4DB2-BD59-A6C34878D82A}">
+                    <a16:rowId xmlns:a16="http://schemas.microsoft.com/office/drawing/2014/main" val="2971610738"/>
+                  </a:ext>
+                </a:extLst>
+              </a:tr>
+              <a:tr h="165512">
+                <a:tc>
+                  <a:txBody>
+                    <a:bodyPr/>
+                    <a:lstStyle/>
+                    <a:p>
+                      <a:pPr marL="57150" marR="0">
+                        <a:spcBef>
+                          <a:spcPts val="505"/>
+                        </a:spcBef>
+                        <a:spcAft>
+                          <a:spcPts val="0"/>
+                        </a:spcAft>
+                      </a:pPr>
+                      <a:r>
+                        <a:rPr lang="es-MX" sz="500" b="0" dirty="0">
+                          <a:solidFill>
+                            <a:schemeClr val="tx1"/>
+                          </a:solidFill>
+                          <a:effectLst/>
+                          <a:latin typeface="Calibri" panose="020F0502020204030204" pitchFamily="34" charset="0"/>
+                          <a:ea typeface="Calibri" panose="020F0502020204030204" pitchFamily="34" charset="0"/>
+                          <a:cs typeface="Times New Roman" panose="02020603050405020304" pitchFamily="18" charset="0"/>
+                        </a:rPr>
+                        <a:t>ARIMA (1,1,1) de LOG </a:t>
+                      </a:r>
+                    </a:p>
+                  </a:txBody>
+                  <a:tcPr marL="0" marR="0" marT="0" marB="0" anchor="ctr">
+                    <a:lnL w="12700" cap="flat" cmpd="sng" algn="ctr">
+                      <a:solidFill>
+                        <a:schemeClr val="tx1"/>
+                      </a:solidFill>
+                      <a:prstDash val="solid"/>
+                      <a:round/>
+                      <a:headEnd type="none" w="med" len="med"/>
+                      <a:tailEnd type="none" w="med" len="med"/>
+                    </a:lnL>
+                    <a:lnR w="12700" cap="flat" cmpd="sng" algn="ctr">
+                      <a:solidFill>
+                        <a:schemeClr val="tx1"/>
+                      </a:solidFill>
+                      <a:prstDash val="solid"/>
+                      <a:round/>
+                      <a:headEnd type="none" w="med" len="med"/>
+                      <a:tailEnd type="none" w="med" len="med"/>
+                    </a:lnR>
+                    <a:lnT w="12700" cap="flat" cmpd="sng" algn="ctr">
+                      <a:solidFill>
+                        <a:schemeClr val="tx1"/>
+                      </a:solidFill>
+                      <a:prstDash val="solid"/>
+                      <a:round/>
+                      <a:headEnd type="none" w="med" len="med"/>
+                      <a:tailEnd type="none" w="med" len="med"/>
+                    </a:lnT>
+                    <a:lnB w="12700" cap="flat" cmpd="sng" algn="ctr">
+                      <a:solidFill>
+                        <a:schemeClr val="tx1"/>
+                      </a:solidFill>
+                      <a:prstDash val="solid"/>
+                      <a:round/>
+                      <a:headEnd type="none" w="med" len="med"/>
+                      <a:tailEnd type="none" w="med" len="med"/>
+                    </a:lnB>
+                    <a:noFill/>
+                  </a:tcPr>
+                </a:tc>
+                <a:tc>
+                  <a:txBody>
+                    <a:bodyPr/>
+                    <a:lstStyle/>
+                    <a:p>
+                      <a:pPr marL="60325" marR="0">
+                        <a:spcBef>
+                          <a:spcPts val="505"/>
+                        </a:spcBef>
+                        <a:spcAft>
+                          <a:spcPts val="0"/>
+                        </a:spcAft>
+                      </a:pPr>
+                      <a:r>
+                        <a:rPr lang="es-ES" sz="500" b="0" dirty="0">
+                          <a:solidFill>
+                            <a:schemeClr val="tx1"/>
+                          </a:solidFill>
+                          <a:effectLst/>
+                        </a:rPr>
+                        <a:t>17.5%</a:t>
+                      </a:r>
+                      <a:endParaRPr lang="es-MX" sz="500" b="0" dirty="0">
+                        <a:solidFill>
+                          <a:schemeClr val="tx1"/>
+                        </a:solidFill>
+                        <a:effectLst/>
+                        <a:latin typeface="Calibri" panose="020F0502020204030204" pitchFamily="34" charset="0"/>
+                        <a:ea typeface="Calibri" panose="020F0502020204030204" pitchFamily="34" charset="0"/>
+                        <a:cs typeface="Times New Roman" panose="02020603050405020304" pitchFamily="18" charset="0"/>
+                      </a:endParaRPr>
+                    </a:p>
+                  </a:txBody>
+                  <a:tcPr marL="0" marR="0" marT="0" marB="0" anchor="ctr">
+                    <a:lnL w="12700" cap="flat" cmpd="sng" algn="ctr">
+                      <a:solidFill>
+                        <a:schemeClr val="tx1"/>
+                      </a:solidFill>
+                      <a:prstDash val="solid"/>
+                      <a:round/>
+                      <a:headEnd type="none" w="med" len="med"/>
+                      <a:tailEnd type="none" w="med" len="med"/>
+                    </a:lnL>
+                    <a:lnR w="12700" cap="flat" cmpd="sng" algn="ctr">
+                      <a:solidFill>
+                        <a:schemeClr val="tx1"/>
+                      </a:solidFill>
+                      <a:prstDash val="solid"/>
+                      <a:round/>
+                      <a:headEnd type="none" w="med" len="med"/>
+                      <a:tailEnd type="none" w="med" len="med"/>
+                    </a:lnR>
+                    <a:lnT w="12700" cap="flat" cmpd="sng" algn="ctr">
+                      <a:solidFill>
+                        <a:schemeClr val="tx1"/>
+                      </a:solidFill>
+                      <a:prstDash val="solid"/>
+                      <a:round/>
+                      <a:headEnd type="none" w="med" len="med"/>
+                      <a:tailEnd type="none" w="med" len="med"/>
+                    </a:lnT>
+                    <a:lnB w="12700" cap="flat" cmpd="sng" algn="ctr">
+                      <a:solidFill>
+                        <a:schemeClr val="tx1"/>
+                      </a:solidFill>
+                      <a:prstDash val="solid"/>
+                      <a:round/>
+                      <a:headEnd type="none" w="med" len="med"/>
+                      <a:tailEnd type="none" w="med" len="med"/>
+                    </a:lnB>
+                    <a:noFill/>
+                  </a:tcPr>
+                </a:tc>
+                <a:tc>
+                  <a:txBody>
+                    <a:bodyPr/>
+                    <a:lstStyle/>
+                    <a:p>
+                      <a:pPr marL="63500" marR="86360">
+                        <a:spcBef>
+                          <a:spcPts val="505"/>
+                        </a:spcBef>
+                        <a:spcAft>
+                          <a:spcPts val="0"/>
+                        </a:spcAft>
+                      </a:pPr>
+                      <a:r>
+                        <a:rPr lang="es-MX" sz="500" b="0" dirty="0">
+                          <a:solidFill>
+                            <a:schemeClr val="tx1"/>
+                          </a:solidFill>
+                          <a:effectLst/>
+                          <a:latin typeface="Calibri" panose="020F0502020204030204" pitchFamily="34" charset="0"/>
+                          <a:ea typeface="Calibri" panose="020F0502020204030204" pitchFamily="34" charset="0"/>
+                          <a:cs typeface="Times New Roman" panose="02020603050405020304" pitchFamily="18" charset="0"/>
+                        </a:rPr>
+                        <a:t>Se transforma la demanda a log(Demanda)</a:t>
+                      </a:r>
+                    </a:p>
+                  </a:txBody>
+                  <a:tcPr marL="0" marR="0" marT="0" marB="0" anchor="ctr">
+                    <a:lnL w="12700" cap="flat" cmpd="sng" algn="ctr">
+                      <a:solidFill>
+                        <a:schemeClr val="tx1"/>
+                      </a:solidFill>
+                      <a:prstDash val="solid"/>
+                      <a:round/>
+                      <a:headEnd type="none" w="med" len="med"/>
+                      <a:tailEnd type="none" w="med" len="med"/>
+                    </a:lnL>
+                    <a:lnR w="12700" cap="flat" cmpd="sng" algn="ctr">
+                      <a:solidFill>
+                        <a:schemeClr val="tx1"/>
+                      </a:solidFill>
+                      <a:prstDash val="solid"/>
+                      <a:round/>
+                      <a:headEnd type="none" w="med" len="med"/>
+                      <a:tailEnd type="none" w="med" len="med"/>
+                    </a:lnR>
+                    <a:lnT w="12700" cap="flat" cmpd="sng" algn="ctr">
+                      <a:solidFill>
+                        <a:schemeClr val="tx1"/>
+                      </a:solidFill>
+                      <a:prstDash val="solid"/>
+                      <a:round/>
+                      <a:headEnd type="none" w="med" len="med"/>
+                      <a:tailEnd type="none" w="med" len="med"/>
+                    </a:lnT>
+                    <a:lnB w="12700" cap="flat" cmpd="sng" algn="ctr">
+                      <a:solidFill>
+                        <a:schemeClr val="tx1"/>
+                      </a:solidFill>
+                      <a:prstDash val="solid"/>
+                      <a:round/>
+                      <a:headEnd type="none" w="med" len="med"/>
+                      <a:tailEnd type="none" w="med" len="med"/>
+                    </a:lnB>
+                    <a:noFill/>
+                  </a:tcPr>
+                </a:tc>
+                <a:extLst>
+                  <a:ext uri="{0D108BD9-81ED-4DB2-BD59-A6C34878D82A}">
+                    <a16:rowId xmlns:a16="http://schemas.microsoft.com/office/drawing/2014/main" val="186239642"/>
+                  </a:ext>
+                </a:extLst>
+              </a:tr>
+              <a:tr h="165512">
+                <a:tc>
+                  <a:txBody>
+                    <a:bodyPr/>
+                    <a:lstStyle/>
+                    <a:p>
+                      <a:pPr marL="57150" marR="0">
+                        <a:spcBef>
+                          <a:spcPts val="515"/>
+                        </a:spcBef>
+                        <a:spcAft>
+                          <a:spcPts val="0"/>
+                        </a:spcAft>
+                      </a:pPr>
+                      <a:r>
+                        <a:rPr lang="es-MX" sz="500" b="0" dirty="0">
+                          <a:solidFill>
+                            <a:schemeClr val="tx1"/>
+                          </a:solidFill>
+                          <a:effectLst/>
+                          <a:latin typeface="Calibri" panose="020F0502020204030204" pitchFamily="34" charset="0"/>
+                          <a:ea typeface="Calibri" panose="020F0502020204030204" pitchFamily="34" charset="0"/>
+                          <a:cs typeface="Times New Roman" panose="02020603050405020304" pitchFamily="18" charset="0"/>
+                        </a:rPr>
+                        <a:t>ARIMA (1,1,1) de Serie previamente ajustada con (SMA) </a:t>
+                      </a:r>
+                    </a:p>
+                  </a:txBody>
+                  <a:tcPr marL="0" marR="0" marT="0" marB="0" anchor="ctr">
+                    <a:lnL w="12700" cap="flat" cmpd="sng" algn="ctr">
+                      <a:solidFill>
+                        <a:schemeClr val="tx1"/>
+                      </a:solidFill>
+                      <a:prstDash val="solid"/>
+                      <a:round/>
+                      <a:headEnd type="none" w="med" len="med"/>
+                      <a:tailEnd type="none" w="med" len="med"/>
+                    </a:lnL>
+                    <a:lnR w="12700" cap="flat" cmpd="sng" algn="ctr">
+                      <a:solidFill>
+                        <a:schemeClr val="tx1"/>
+                      </a:solidFill>
+                      <a:prstDash val="solid"/>
+                      <a:round/>
+                      <a:headEnd type="none" w="med" len="med"/>
+                      <a:tailEnd type="none" w="med" len="med"/>
+                    </a:lnR>
+                    <a:lnT w="12700" cap="flat" cmpd="sng" algn="ctr">
+                      <a:solidFill>
+                        <a:schemeClr val="tx1"/>
+                      </a:solidFill>
+                      <a:prstDash val="solid"/>
+                      <a:round/>
+                      <a:headEnd type="none" w="med" len="med"/>
+                      <a:tailEnd type="none" w="med" len="med"/>
+                    </a:lnT>
+                    <a:lnB w="12700" cap="flat" cmpd="sng" algn="ctr">
+                      <a:solidFill>
+                        <a:schemeClr val="tx1"/>
+                      </a:solidFill>
+                      <a:prstDash val="solid"/>
+                      <a:round/>
+                      <a:headEnd type="none" w="med" len="med"/>
+                      <a:tailEnd type="none" w="med" len="med"/>
+                    </a:lnB>
+                    <a:noFill/>
+                  </a:tcPr>
+                </a:tc>
+                <a:tc>
+                  <a:txBody>
+                    <a:bodyPr/>
+                    <a:lstStyle/>
+                    <a:p>
+                      <a:pPr marL="60325" marR="89535">
+                        <a:spcBef>
+                          <a:spcPts val="515"/>
+                        </a:spcBef>
+                        <a:spcAft>
+                          <a:spcPts val="0"/>
+                        </a:spcAft>
+                      </a:pPr>
+                      <a:r>
+                        <a:rPr lang="es-ES" sz="500" b="0" dirty="0">
+                          <a:solidFill>
+                            <a:schemeClr val="tx1"/>
+                          </a:solidFill>
+                          <a:effectLst/>
+                        </a:rPr>
+                        <a:t>17.8%</a:t>
+                      </a:r>
+                      <a:endParaRPr lang="es-MX" sz="500" b="0" dirty="0">
+                        <a:solidFill>
+                          <a:schemeClr val="tx1"/>
+                        </a:solidFill>
+                        <a:effectLst/>
+                        <a:latin typeface="Calibri" panose="020F0502020204030204" pitchFamily="34" charset="0"/>
+                        <a:ea typeface="Calibri" panose="020F0502020204030204" pitchFamily="34" charset="0"/>
+                        <a:cs typeface="Times New Roman" panose="02020603050405020304" pitchFamily="18" charset="0"/>
+                      </a:endParaRPr>
+                    </a:p>
+                  </a:txBody>
+                  <a:tcPr marL="0" marR="0" marT="0" marB="0" anchor="ctr">
+                    <a:lnL w="12700" cap="flat" cmpd="sng" algn="ctr">
+                      <a:solidFill>
+                        <a:schemeClr val="tx1"/>
+                      </a:solidFill>
+                      <a:prstDash val="solid"/>
+                      <a:round/>
+                      <a:headEnd type="none" w="med" len="med"/>
+                      <a:tailEnd type="none" w="med" len="med"/>
+                    </a:lnL>
+                    <a:lnR w="12700" cap="flat" cmpd="sng" algn="ctr">
+                      <a:solidFill>
+                        <a:schemeClr val="tx1"/>
+                      </a:solidFill>
+                      <a:prstDash val="solid"/>
+                      <a:round/>
+                      <a:headEnd type="none" w="med" len="med"/>
+                      <a:tailEnd type="none" w="med" len="med"/>
+                    </a:lnR>
+                    <a:lnT w="12700" cap="flat" cmpd="sng" algn="ctr">
+                      <a:solidFill>
+                        <a:schemeClr val="tx1"/>
+                      </a:solidFill>
+                      <a:prstDash val="solid"/>
+                      <a:round/>
+                      <a:headEnd type="none" w="med" len="med"/>
+                      <a:tailEnd type="none" w="med" len="med"/>
+                    </a:lnT>
+                    <a:lnB w="12700" cap="flat" cmpd="sng" algn="ctr">
+                      <a:solidFill>
+                        <a:schemeClr val="tx1"/>
+                      </a:solidFill>
+                      <a:prstDash val="solid"/>
+                      <a:round/>
+                      <a:headEnd type="none" w="med" len="med"/>
+                      <a:tailEnd type="none" w="med" len="med"/>
+                    </a:lnB>
+                    <a:noFill/>
+                  </a:tcPr>
+                </a:tc>
+                <a:tc>
+                  <a:txBody>
+                    <a:bodyPr/>
+                    <a:lstStyle/>
+                    <a:p>
+                      <a:pPr marL="63500" marR="86360">
+                        <a:spcBef>
+                          <a:spcPts val="505"/>
+                        </a:spcBef>
+                        <a:spcAft>
+                          <a:spcPts val="0"/>
+                        </a:spcAft>
+                      </a:pPr>
+                      <a:r>
+                        <a:rPr lang="es-MX" sz="500" b="0" dirty="0">
+                          <a:solidFill>
+                            <a:schemeClr val="tx1"/>
+                          </a:solidFill>
+                          <a:effectLst/>
+                          <a:latin typeface="Calibri" panose="020F0502020204030204" pitchFamily="34" charset="0"/>
+                          <a:ea typeface="Calibri" panose="020F0502020204030204" pitchFamily="34" charset="0"/>
+                          <a:cs typeface="Times New Roman" panose="02020603050405020304" pitchFamily="18" charset="0"/>
+                        </a:rPr>
+                        <a:t>Se ajusta un modelo para el caso de la serie previamente suavizada </a:t>
+                      </a:r>
+                    </a:p>
+                  </a:txBody>
+                  <a:tcPr marL="0" marR="0" marT="0" marB="0" anchor="ctr">
+                    <a:lnL w="12700" cap="flat" cmpd="sng" algn="ctr">
+                      <a:solidFill>
+                        <a:schemeClr val="tx1"/>
+                      </a:solidFill>
+                      <a:prstDash val="solid"/>
+                      <a:round/>
+                      <a:headEnd type="none" w="med" len="med"/>
+                      <a:tailEnd type="none" w="med" len="med"/>
+                    </a:lnL>
+                    <a:lnR w="12700" cap="flat" cmpd="sng" algn="ctr">
+                      <a:solidFill>
+                        <a:schemeClr val="tx1"/>
+                      </a:solidFill>
+                      <a:prstDash val="solid"/>
+                      <a:round/>
+                      <a:headEnd type="none" w="med" len="med"/>
+                      <a:tailEnd type="none" w="med" len="med"/>
+                    </a:lnR>
+                    <a:lnT w="12700" cap="flat" cmpd="sng" algn="ctr">
+                      <a:solidFill>
+                        <a:schemeClr val="tx1"/>
+                      </a:solidFill>
+                      <a:prstDash val="solid"/>
+                      <a:round/>
+                      <a:headEnd type="none" w="med" len="med"/>
+                      <a:tailEnd type="none" w="med" len="med"/>
+                    </a:lnT>
+                    <a:lnB w="12700" cap="flat" cmpd="sng" algn="ctr">
+                      <a:solidFill>
+                        <a:schemeClr val="tx1"/>
+                      </a:solidFill>
+                      <a:prstDash val="solid"/>
+                      <a:round/>
+                      <a:headEnd type="none" w="med" len="med"/>
+                      <a:tailEnd type="none" w="med" len="med"/>
+                    </a:lnB>
+                    <a:noFill/>
+                  </a:tcPr>
+                </a:tc>
+                <a:extLst>
+                  <a:ext uri="{0D108BD9-81ED-4DB2-BD59-A6C34878D82A}">
+                    <a16:rowId xmlns:a16="http://schemas.microsoft.com/office/drawing/2014/main" val="2474187109"/>
+                  </a:ext>
+                </a:extLst>
+              </a:tr>
+              <a:tr h="165512">
+                <a:tc>
+                  <a:txBody>
+                    <a:bodyPr/>
+                    <a:lstStyle/>
+                    <a:p>
+                      <a:pPr marL="57150" marR="0">
+                        <a:spcBef>
+                          <a:spcPts val="515"/>
+                        </a:spcBef>
+                        <a:spcAft>
+                          <a:spcPts val="0"/>
+                        </a:spcAft>
+                      </a:pPr>
+                      <a:r>
+                        <a:rPr lang="es-MX" sz="500" b="0" dirty="0">
+                          <a:solidFill>
+                            <a:schemeClr val="tx1"/>
+                          </a:solidFill>
+                          <a:effectLst/>
+                          <a:latin typeface="Calibri" panose="020F0502020204030204" pitchFamily="34" charset="0"/>
+                          <a:ea typeface="Calibri" panose="020F0502020204030204" pitchFamily="34" charset="0"/>
+                          <a:cs typeface="Times New Roman" panose="02020603050405020304" pitchFamily="18" charset="0"/>
+                        </a:rPr>
+                        <a:t>SARIMA (1,1,1) (1,1,0)[12] (Con datos de </a:t>
+                      </a:r>
+                      <a:r>
+                        <a:rPr lang="es-MX" sz="500" b="0" dirty="0" err="1">
+                          <a:solidFill>
+                            <a:schemeClr val="tx1"/>
+                          </a:solidFill>
+                          <a:effectLst/>
+                          <a:latin typeface="Calibri" panose="020F0502020204030204" pitchFamily="34" charset="0"/>
+                          <a:ea typeface="Calibri" panose="020F0502020204030204" pitchFamily="34" charset="0"/>
+                          <a:cs typeface="Times New Roman" panose="02020603050405020304" pitchFamily="18" charset="0"/>
+                        </a:rPr>
+                        <a:t>train</a:t>
+                      </a:r>
+                      <a:r>
+                        <a:rPr lang="es-MX" sz="500" b="0" dirty="0">
+                          <a:solidFill>
+                            <a:schemeClr val="tx1"/>
+                          </a:solidFill>
+                          <a:effectLst/>
+                          <a:latin typeface="Calibri" panose="020F0502020204030204" pitchFamily="34" charset="0"/>
+                          <a:ea typeface="Calibri" panose="020F0502020204030204" pitchFamily="34" charset="0"/>
+                          <a:cs typeface="Times New Roman" panose="02020603050405020304" pitchFamily="18" charset="0"/>
+                        </a:rPr>
+                        <a:t> recortados a 2019)</a:t>
+                      </a:r>
+                    </a:p>
+                  </a:txBody>
+                  <a:tcPr marL="0" marR="0" marT="0" marB="0" anchor="ctr">
+                    <a:lnL w="12700" cap="flat" cmpd="sng" algn="ctr">
+                      <a:solidFill>
+                        <a:schemeClr val="tx1"/>
+                      </a:solidFill>
+                      <a:prstDash val="solid"/>
+                      <a:round/>
+                      <a:headEnd type="none" w="med" len="med"/>
+                      <a:tailEnd type="none" w="med" len="med"/>
+                    </a:lnL>
+                    <a:lnR w="12700" cap="flat" cmpd="sng" algn="ctr">
+                      <a:solidFill>
+                        <a:schemeClr val="tx1"/>
+                      </a:solidFill>
+                      <a:prstDash val="solid"/>
+                      <a:round/>
+                      <a:headEnd type="none" w="med" len="med"/>
+                      <a:tailEnd type="none" w="med" len="med"/>
+                    </a:lnR>
+                    <a:lnT w="12700" cap="flat" cmpd="sng" algn="ctr">
+                      <a:solidFill>
+                        <a:schemeClr val="tx1"/>
+                      </a:solidFill>
+                      <a:prstDash val="solid"/>
+                      <a:round/>
+                      <a:headEnd type="none" w="med" len="med"/>
+                      <a:tailEnd type="none" w="med" len="med"/>
+                    </a:lnT>
+                    <a:lnB w="12700" cap="flat" cmpd="sng" algn="ctr">
+                      <a:solidFill>
+                        <a:schemeClr val="tx1"/>
+                      </a:solidFill>
+                      <a:prstDash val="solid"/>
+                      <a:round/>
+                      <a:headEnd type="none" w="med" len="med"/>
+                      <a:tailEnd type="none" w="med" len="med"/>
+                    </a:lnB>
+                    <a:noFill/>
+                  </a:tcPr>
+                </a:tc>
+                <a:tc>
+                  <a:txBody>
+                    <a:bodyPr/>
+                    <a:lstStyle/>
+                    <a:p>
+                      <a:pPr marL="60325" marR="89535">
+                        <a:spcBef>
+                          <a:spcPts val="515"/>
+                        </a:spcBef>
+                        <a:spcAft>
+                          <a:spcPts val="0"/>
+                        </a:spcAft>
+                      </a:pPr>
+                      <a:r>
+                        <a:rPr lang="es-MX" sz="500" b="0" dirty="0">
+                          <a:solidFill>
+                            <a:schemeClr val="tx1"/>
+                          </a:solidFill>
+                          <a:effectLst/>
+                          <a:latin typeface="Calibri" panose="020F0502020204030204" pitchFamily="34" charset="0"/>
+                          <a:ea typeface="Calibri" panose="020F0502020204030204" pitchFamily="34" charset="0"/>
+                          <a:cs typeface="Times New Roman" panose="02020603050405020304" pitchFamily="18" charset="0"/>
+                        </a:rPr>
+                        <a:t>12.4%</a:t>
+                      </a:r>
+                    </a:p>
+                  </a:txBody>
+                  <a:tcPr marL="0" marR="0" marT="0" marB="0" anchor="ctr">
+                    <a:lnL w="12700" cap="flat" cmpd="sng" algn="ctr">
+                      <a:solidFill>
+                        <a:schemeClr val="tx1"/>
+                      </a:solidFill>
+                      <a:prstDash val="solid"/>
+                      <a:round/>
+                      <a:headEnd type="none" w="med" len="med"/>
+                      <a:tailEnd type="none" w="med" len="med"/>
+                    </a:lnL>
+                    <a:lnR w="12700" cap="flat" cmpd="sng" algn="ctr">
+                      <a:solidFill>
+                        <a:schemeClr val="tx1"/>
+                      </a:solidFill>
+                      <a:prstDash val="solid"/>
+                      <a:round/>
+                      <a:headEnd type="none" w="med" len="med"/>
+                      <a:tailEnd type="none" w="med" len="med"/>
+                    </a:lnR>
+                    <a:lnT w="12700" cap="flat" cmpd="sng" algn="ctr">
+                      <a:solidFill>
+                        <a:schemeClr val="tx1"/>
+                      </a:solidFill>
+                      <a:prstDash val="solid"/>
+                      <a:round/>
+                      <a:headEnd type="none" w="med" len="med"/>
+                      <a:tailEnd type="none" w="med" len="med"/>
+                    </a:lnT>
+                    <a:lnB w="12700" cap="flat" cmpd="sng" algn="ctr">
+                      <a:solidFill>
+                        <a:schemeClr val="tx1"/>
+                      </a:solidFill>
+                      <a:prstDash val="solid"/>
+                      <a:round/>
+                      <a:headEnd type="none" w="med" len="med"/>
+                      <a:tailEnd type="none" w="med" len="med"/>
+                    </a:lnB>
+                    <a:noFill/>
+                  </a:tcPr>
+                </a:tc>
+                <a:tc>
+                  <a:txBody>
+                    <a:bodyPr/>
+                    <a:lstStyle/>
+                    <a:p>
+                      <a:pPr marL="63500" marR="86360" lvl="0" indent="0" algn="l" defTabSz="914400" rtl="0" eaLnBrk="1" fontAlgn="auto" latinLnBrk="0" hangingPunct="1">
+                        <a:lnSpc>
+                          <a:spcPct val="100000"/>
+                        </a:lnSpc>
+                        <a:spcBef>
+                          <a:spcPts val="505"/>
+                        </a:spcBef>
+                        <a:spcAft>
+                          <a:spcPts val="0"/>
+                        </a:spcAft>
+                        <a:buClr>
+                          <a:srgbClr val="000000"/>
+                        </a:buClr>
+                        <a:buSzTx/>
+                        <a:buFont typeface="Arial"/>
+                        <a:buNone/>
+                        <a:tabLst/>
+                        <a:defRPr/>
+                      </a:pPr>
+                      <a:r>
+                        <a:rPr lang="es-MX" sz="500" b="0" dirty="0">
+                          <a:solidFill>
+                            <a:schemeClr val="tx1"/>
+                          </a:solidFill>
+                          <a:effectLst/>
+                          <a:latin typeface="Calibri" panose="020F0502020204030204" pitchFamily="34" charset="0"/>
+                          <a:ea typeface="Calibri" panose="020F0502020204030204" pitchFamily="34" charset="0"/>
+                          <a:cs typeface="Times New Roman" panose="02020603050405020304" pitchFamily="18" charset="0"/>
+                        </a:rPr>
+                        <a:t>Se ajusta un modelo para el caso de la serie donde los datos de entrenamiento  se recortan a solo 2015-2019 (recortando valores </a:t>
+                      </a:r>
+                      <a:r>
+                        <a:rPr lang="es-MX" sz="500" b="0" dirty="0" err="1">
+                          <a:solidFill>
+                            <a:schemeClr val="tx1"/>
+                          </a:solidFill>
+                          <a:effectLst/>
+                          <a:latin typeface="Calibri" panose="020F0502020204030204" pitchFamily="34" charset="0"/>
+                          <a:ea typeface="Calibri" panose="020F0502020204030204" pitchFamily="34" charset="0"/>
+                          <a:cs typeface="Times New Roman" panose="02020603050405020304" pitchFamily="18" charset="0"/>
+                        </a:rPr>
+                        <a:t>outliers</a:t>
+                      </a:r>
+                      <a:r>
+                        <a:rPr lang="es-MX" sz="500" b="0" dirty="0">
+                          <a:solidFill>
+                            <a:schemeClr val="tx1"/>
+                          </a:solidFill>
+                          <a:effectLst/>
+                          <a:latin typeface="Calibri" panose="020F0502020204030204" pitchFamily="34" charset="0"/>
+                          <a:ea typeface="Calibri" panose="020F0502020204030204" pitchFamily="34" charset="0"/>
+                          <a:cs typeface="Times New Roman" panose="02020603050405020304" pitchFamily="18" charset="0"/>
+                        </a:rPr>
+                        <a:t> provocados por </a:t>
+                      </a:r>
+                      <a:r>
+                        <a:rPr lang="es-MX" sz="500" b="0" dirty="0" err="1">
+                          <a:solidFill>
+                            <a:schemeClr val="tx1"/>
+                          </a:solidFill>
+                          <a:effectLst/>
+                          <a:latin typeface="Calibri" panose="020F0502020204030204" pitchFamily="34" charset="0"/>
+                          <a:ea typeface="Calibri" panose="020F0502020204030204" pitchFamily="34" charset="0"/>
+                          <a:cs typeface="Times New Roman" panose="02020603050405020304" pitchFamily="18" charset="0"/>
+                        </a:rPr>
+                        <a:t>covid</a:t>
+                      </a:r>
+                      <a:r>
+                        <a:rPr lang="es-MX" sz="500" b="0" dirty="0">
+                          <a:solidFill>
+                            <a:schemeClr val="tx1"/>
+                          </a:solidFill>
+                          <a:effectLst/>
+                          <a:latin typeface="Calibri" panose="020F0502020204030204" pitchFamily="34" charset="0"/>
+                          <a:ea typeface="Calibri" panose="020F0502020204030204" pitchFamily="34" charset="0"/>
+                          <a:cs typeface="Times New Roman" panose="02020603050405020304" pitchFamily="18" charset="0"/>
+                        </a:rPr>
+                        <a:t> )</a:t>
+                      </a:r>
+                    </a:p>
+                  </a:txBody>
+                  <a:tcPr marL="0" marR="0" marT="0" marB="0" anchor="ctr">
+                    <a:lnL w="12700" cap="flat" cmpd="sng" algn="ctr">
+                      <a:solidFill>
+                        <a:schemeClr val="tx1"/>
+                      </a:solidFill>
+                      <a:prstDash val="solid"/>
+                      <a:round/>
+                      <a:headEnd type="none" w="med" len="med"/>
+                      <a:tailEnd type="none" w="med" len="med"/>
+                    </a:lnL>
+                    <a:lnR w="12700" cap="flat" cmpd="sng" algn="ctr">
+                      <a:solidFill>
+                        <a:schemeClr val="tx1"/>
+                      </a:solidFill>
+                      <a:prstDash val="solid"/>
+                      <a:round/>
+                      <a:headEnd type="none" w="med" len="med"/>
+                      <a:tailEnd type="none" w="med" len="med"/>
+                    </a:lnR>
+                    <a:lnT w="12700" cap="flat" cmpd="sng" algn="ctr">
+                      <a:solidFill>
+                        <a:schemeClr val="tx1"/>
+                      </a:solidFill>
+                      <a:prstDash val="solid"/>
+                      <a:round/>
+                      <a:headEnd type="none" w="med" len="med"/>
+                      <a:tailEnd type="none" w="med" len="med"/>
+                    </a:lnT>
+                    <a:lnB w="12700" cap="flat" cmpd="sng" algn="ctr">
+                      <a:solidFill>
+                        <a:schemeClr val="tx1"/>
+                      </a:solidFill>
+                      <a:prstDash val="solid"/>
+                      <a:round/>
+                      <a:headEnd type="none" w="med" len="med"/>
+                      <a:tailEnd type="none" w="med" len="med"/>
+                    </a:lnB>
+                    <a:noFill/>
+                  </a:tcPr>
+                </a:tc>
+                <a:extLst>
+                  <a:ext uri="{0D108BD9-81ED-4DB2-BD59-A6C34878D82A}">
+                    <a16:rowId xmlns:a16="http://schemas.microsoft.com/office/drawing/2014/main" val="2408842244"/>
+                  </a:ext>
+                </a:extLst>
+              </a:tr>
+            </a:tbl>
+          </a:graphicData>
+        </a:graphic>
+      </p:graphicFrame>
     </p:spTree>
     <p:extLst>
       <p:ext uri="{BB962C8B-B14F-4D97-AF65-F5344CB8AC3E}">

</xml_diff>